<commit_message>
Updated REDCap-ETL to 1.2.0
</commit_message>
<xml_diff>
--- a/dependencies/iu-redcap/redcap-etl/docs/etl-process.pptx
+++ b/dependencies/iu-redcap/redcap-etl/docs/etl-process.pptx
@@ -243,7 +243,7 @@
           <a:p>
             <a:fld id="{B44A8295-E98B-4C13-8791-4EE2BD1A3C5E}" type="datetimeFigureOut">
               <a:rPr lang="en-US" smtClean="0"/>
-              <a:t>4/2/2019</a:t>
+              <a:t>10/1/2019</a:t>
             </a:fld>
             <a:endParaRPr lang="en-US"/>
           </a:p>
@@ -413,7 +413,7 @@
           <a:p>
             <a:fld id="{B44A8295-E98B-4C13-8791-4EE2BD1A3C5E}" type="datetimeFigureOut">
               <a:rPr lang="en-US" smtClean="0"/>
-              <a:t>4/2/2019</a:t>
+              <a:t>10/1/2019</a:t>
             </a:fld>
             <a:endParaRPr lang="en-US"/>
           </a:p>
@@ -593,7 +593,7 @@
           <a:p>
             <a:fld id="{B44A8295-E98B-4C13-8791-4EE2BD1A3C5E}" type="datetimeFigureOut">
               <a:rPr lang="en-US" smtClean="0"/>
-              <a:t>4/2/2019</a:t>
+              <a:t>10/1/2019</a:t>
             </a:fld>
             <a:endParaRPr lang="en-US"/>
           </a:p>
@@ -763,7 +763,7 @@
           <a:p>
             <a:fld id="{B44A8295-E98B-4C13-8791-4EE2BD1A3C5E}" type="datetimeFigureOut">
               <a:rPr lang="en-US" smtClean="0"/>
-              <a:t>4/2/2019</a:t>
+              <a:t>10/1/2019</a:t>
             </a:fld>
             <a:endParaRPr lang="en-US"/>
           </a:p>
@@ -1009,7 +1009,7 @@
           <a:p>
             <a:fld id="{B44A8295-E98B-4C13-8791-4EE2BD1A3C5E}" type="datetimeFigureOut">
               <a:rPr lang="en-US" smtClean="0"/>
-              <a:t>4/2/2019</a:t>
+              <a:t>10/1/2019</a:t>
             </a:fld>
             <a:endParaRPr lang="en-US"/>
           </a:p>
@@ -1241,7 +1241,7 @@
           <a:p>
             <a:fld id="{B44A8295-E98B-4C13-8791-4EE2BD1A3C5E}" type="datetimeFigureOut">
               <a:rPr lang="en-US" smtClean="0"/>
-              <a:t>4/2/2019</a:t>
+              <a:t>10/1/2019</a:t>
             </a:fld>
             <a:endParaRPr lang="en-US"/>
           </a:p>
@@ -1608,7 +1608,7 @@
           <a:p>
             <a:fld id="{B44A8295-E98B-4C13-8791-4EE2BD1A3C5E}" type="datetimeFigureOut">
               <a:rPr lang="en-US" smtClean="0"/>
-              <a:t>4/2/2019</a:t>
+              <a:t>10/1/2019</a:t>
             </a:fld>
             <a:endParaRPr lang="en-US"/>
           </a:p>
@@ -1726,7 +1726,7 @@
           <a:p>
             <a:fld id="{B44A8295-E98B-4C13-8791-4EE2BD1A3C5E}" type="datetimeFigureOut">
               <a:rPr lang="en-US" smtClean="0"/>
-              <a:t>4/2/2019</a:t>
+              <a:t>10/1/2019</a:t>
             </a:fld>
             <a:endParaRPr lang="en-US"/>
           </a:p>
@@ -1821,7 +1821,7 @@
           <a:p>
             <a:fld id="{B44A8295-E98B-4C13-8791-4EE2BD1A3C5E}" type="datetimeFigureOut">
               <a:rPr lang="en-US" smtClean="0"/>
-              <a:t>4/2/2019</a:t>
+              <a:t>10/1/2019</a:t>
             </a:fld>
             <a:endParaRPr lang="en-US"/>
           </a:p>
@@ -2098,7 +2098,7 @@
           <a:p>
             <a:fld id="{B44A8295-E98B-4C13-8791-4EE2BD1A3C5E}" type="datetimeFigureOut">
               <a:rPr lang="en-US" smtClean="0"/>
-              <a:t>4/2/2019</a:t>
+              <a:t>10/1/2019</a:t>
             </a:fld>
             <a:endParaRPr lang="en-US"/>
           </a:p>
@@ -2351,7 +2351,7 @@
           <a:p>
             <a:fld id="{B44A8295-E98B-4C13-8791-4EE2BD1A3C5E}" type="datetimeFigureOut">
               <a:rPr lang="en-US" smtClean="0"/>
-              <a:t>4/2/2019</a:t>
+              <a:t>10/1/2019</a:t>
             </a:fld>
             <a:endParaRPr lang="en-US"/>
           </a:p>
@@ -2564,7 +2564,7 @@
           <a:p>
             <a:fld id="{B44A8295-E98B-4C13-8791-4EE2BD1A3C5E}" type="datetimeFigureOut">
               <a:rPr lang="en-US" smtClean="0"/>
-              <a:t>4/2/2019</a:t>
+              <a:t>10/1/2019</a:t>
             </a:fld>
             <a:endParaRPr lang="en-US"/>
           </a:p>
@@ -2971,21 +2971,95 @@
       </p:grpSpPr>
       <p:sp>
         <p:nvSpPr>
-          <p:cNvPr id="22" name="Rectangle 21"/>
+          <p:cNvPr id="87" name="Rounded Rectangle 86"/>
           <p:cNvSpPr/>
           <p:nvPr/>
         </p:nvSpPr>
         <p:spPr>
           <a:xfrm>
-            <a:off x="6179650" y="4420931"/>
-            <a:ext cx="770339" cy="568168"/>
+            <a:off x="3670397" y="873760"/>
+            <a:ext cx="4483674" cy="5669280"/>
+          </a:xfrm>
+          <a:prstGeom prst="roundRect">
+            <a:avLst>
+              <a:gd name="adj" fmla="val 4095"/>
+            </a:avLst>
+          </a:prstGeom>
+          <a:solidFill>
+            <a:schemeClr val="accent1">
+              <a:alpha val="16000"/>
+            </a:schemeClr>
+          </a:solidFill>
+          <a:ln w="25400">
+            <a:prstDash val="sysDash"/>
+          </a:ln>
+        </p:spPr>
+        <p:style>
+          <a:lnRef idx="2">
+            <a:schemeClr val="accent1">
+              <a:shade val="50000"/>
+            </a:schemeClr>
+          </a:lnRef>
+          <a:fillRef idx="1">
+            <a:schemeClr val="accent1"/>
+          </a:fillRef>
+          <a:effectRef idx="0">
+            <a:schemeClr val="accent1"/>
+          </a:effectRef>
+          <a:fontRef idx="minor">
+            <a:schemeClr val="lt1"/>
+          </a:fontRef>
+        </p:style>
+        <p:txBody>
+          <a:bodyPr rtlCol="0" anchor="t" anchorCtr="0"/>
+          <a:lstStyle/>
+          <a:p>
+            <a:pPr algn="ctr"/>
+            <a:r>
+              <a:rPr lang="en-US" b="1" dirty="0" err="1" smtClean="0">
+                <a:solidFill>
+                  <a:schemeClr val="accent5">
+                    <a:lumMod val="75000"/>
+                  </a:schemeClr>
+                </a:solidFill>
+              </a:rPr>
+              <a:t>REDCap</a:t>
+            </a:r>
+            <a:r>
+              <a:rPr lang="en-US" b="1" dirty="0" smtClean="0">
+                <a:solidFill>
+                  <a:schemeClr val="accent5">
+                    <a:lumMod val="75000"/>
+                  </a:schemeClr>
+                </a:solidFill>
+              </a:rPr>
+              <a:t>-ETL server</a:t>
+            </a:r>
+            <a:endParaRPr lang="en-US" b="1" dirty="0">
+              <a:solidFill>
+                <a:schemeClr val="accent5">
+                  <a:lumMod val="75000"/>
+                </a:schemeClr>
+              </a:solidFill>
+            </a:endParaRPr>
+          </a:p>
+        </p:txBody>
+      </p:sp>
+      <p:sp>
+        <p:nvSpPr>
+          <p:cNvPr id="46" name="Rectangle 45"/>
+          <p:cNvSpPr/>
+          <p:nvPr/>
+        </p:nvSpPr>
+        <p:spPr>
+          <a:xfrm>
+            <a:off x="8265793" y="4170563"/>
+            <a:ext cx="500527" cy="307758"/>
           </a:xfrm>
           <a:prstGeom prst="rect">
             <a:avLst/>
           </a:prstGeom>
-          <a:solidFill>
-            <a:schemeClr val="bg1"/>
-          </a:solidFill>
+          <a:noFill/>
           <a:ln>
             <a:noFill/>
           </a:ln>
@@ -3014,7 +3088,67 @@
             <a:r>
               <a:rPr lang="en-US" sz="2000" b="1" dirty="0" smtClean="0">
                 <a:solidFill>
-                  <a:schemeClr val="accent2">
+                  <a:schemeClr val="bg2">
+                    <a:lumMod val="50000"/>
+                  </a:schemeClr>
+                </a:solidFill>
+              </a:rPr>
+              <a:t>Log</a:t>
+            </a:r>
+            <a:endParaRPr lang="en-US" sz="2000" b="1" dirty="0">
+              <a:solidFill>
+                <a:schemeClr val="bg2">
+                  <a:lumMod val="50000"/>
+                </a:schemeClr>
+              </a:solidFill>
+            </a:endParaRPr>
+          </a:p>
+        </p:txBody>
+      </p:sp>
+      <p:sp>
+        <p:nvSpPr>
+          <p:cNvPr id="22" name="Rectangle 21"/>
+          <p:cNvSpPr/>
+          <p:nvPr/>
+        </p:nvSpPr>
+        <p:spPr>
+          <a:xfrm>
+            <a:off x="8154070" y="3143042"/>
+            <a:ext cx="770339" cy="568168"/>
+          </a:xfrm>
+          <a:prstGeom prst="rect">
+            <a:avLst/>
+          </a:prstGeom>
+          <a:noFill/>
+          <a:ln>
+            <a:noFill/>
+          </a:ln>
+        </p:spPr>
+        <p:style>
+          <a:lnRef idx="2">
+            <a:schemeClr val="accent1">
+              <a:shade val="50000"/>
+            </a:schemeClr>
+          </a:lnRef>
+          <a:fillRef idx="1">
+            <a:schemeClr val="accent1"/>
+          </a:fillRef>
+          <a:effectRef idx="0">
+            <a:schemeClr val="accent1"/>
+          </a:effectRef>
+          <a:fontRef idx="minor">
+            <a:schemeClr val="lt1"/>
+          </a:fontRef>
+        </p:style>
+        <p:txBody>
+          <a:bodyPr lIns="0" rIns="0" rtlCol="0" anchor="ctr"/>
+          <a:lstStyle/>
+          <a:p>
+            <a:pPr algn="ctr"/>
+            <a:r>
+              <a:rPr lang="en-US" sz="2000" b="1" dirty="0" smtClean="0">
+                <a:solidFill>
+                  <a:schemeClr val="accent6">
                     <a:lumMod val="75000"/>
                   </a:schemeClr>
                 </a:solidFill>
@@ -3027,7 +3161,7 @@
             <a:r>
               <a:rPr lang="en-US" sz="2000" b="1" dirty="0" smtClean="0">
                 <a:solidFill>
-                  <a:schemeClr val="accent2">
+                  <a:schemeClr val="accent6">
                     <a:lumMod val="75000"/>
                   </a:schemeClr>
                 </a:solidFill>
@@ -3036,7 +3170,7 @@
             </a:r>
             <a:endParaRPr lang="en-US" sz="2000" b="1" dirty="0">
               <a:solidFill>
-                <a:schemeClr val="accent2">
+                <a:schemeClr val="accent6">
                   <a:lumMod val="75000"/>
                 </a:schemeClr>
               </a:solidFill>
@@ -3052,11 +3186,13 @@
         </p:nvSpPr>
         <p:spPr>
           <a:xfrm>
-            <a:off x="1944746" y="304784"/>
-            <a:ext cx="8379941" cy="1814939"/>
+            <a:off x="467274" y="2930305"/>
+            <a:ext cx="2111169" cy="1583196"/>
           </a:xfrm>
           <a:prstGeom prst="roundRect">
-            <a:avLst/>
+            <a:avLst>
+              <a:gd name="adj" fmla="val 9903"/>
+            </a:avLst>
           </a:prstGeom>
           <a:solidFill>
             <a:schemeClr val="accent1">
@@ -3109,14 +3245,14 @@
       </p:sp>
       <p:sp>
         <p:nvSpPr>
-          <p:cNvPr id="5" name="Rectangle 4"/>
+          <p:cNvPr id="7" name="Rectangle 6"/>
           <p:cNvSpPr/>
           <p:nvPr/>
         </p:nvSpPr>
         <p:spPr>
           <a:xfrm>
-            <a:off x="2239861" y="945832"/>
-            <a:ext cx="2390891" cy="674948"/>
+            <a:off x="869393" y="3506499"/>
+            <a:ext cx="1306929" cy="563448"/>
           </a:xfrm>
           <a:prstGeom prst="rect">
             <a:avLst/>
@@ -3154,30 +3290,7 @@
                   </a:schemeClr>
                 </a:solidFill>
               </a:rPr>
-              <a:t>Configuration Project</a:t>
-            </a:r>
-          </a:p>
-          <a:p>
-            <a:pPr algn="ctr"/>
-            <a:r>
-              <a:rPr lang="en-US" dirty="0" smtClean="0">
-                <a:solidFill>
-                  <a:schemeClr val="accent1">
-                    <a:lumMod val="75000"/>
-                  </a:schemeClr>
-                </a:solidFill>
-              </a:rPr>
-              <a:t>(</a:t>
-            </a:r>
-            <a:r>
-              <a:rPr lang="en-US" dirty="0" smtClean="0">
-                <a:solidFill>
-                  <a:schemeClr val="accent1">
-                    <a:lumMod val="75000"/>
-                  </a:schemeClr>
-                </a:solidFill>
-              </a:rPr>
-              <a:t>Optional - Deprecated)</a:t>
+              <a:t>Project</a:t>
             </a:r>
             <a:endParaRPr lang="en-US" dirty="0">
               <a:solidFill>
@@ -3191,154 +3304,13 @@
       </p:sp>
       <p:sp>
         <p:nvSpPr>
-          <p:cNvPr id="6" name="Rectangle 5"/>
-          <p:cNvSpPr/>
-          <p:nvPr/>
-        </p:nvSpPr>
-        <p:spPr>
-          <a:xfrm>
-            <a:off x="7695481" y="945831"/>
-            <a:ext cx="2388086" cy="674948"/>
-          </a:xfrm>
-          <a:prstGeom prst="rect">
-            <a:avLst/>
-          </a:prstGeom>
-          <a:solidFill>
-            <a:schemeClr val="bg1"/>
-          </a:solidFill>
-        </p:spPr>
-        <p:style>
-          <a:lnRef idx="2">
-            <a:schemeClr val="accent1">
-              <a:shade val="50000"/>
-            </a:schemeClr>
-          </a:lnRef>
-          <a:fillRef idx="1">
-            <a:schemeClr val="accent1"/>
-          </a:fillRef>
-          <a:effectRef idx="0">
-            <a:schemeClr val="accent1"/>
-          </a:effectRef>
-          <a:fontRef idx="minor">
-            <a:schemeClr val="lt1"/>
-          </a:fontRef>
-        </p:style>
-        <p:txBody>
-          <a:bodyPr rtlCol="0" anchor="ctr"/>
-          <a:lstStyle/>
-          <a:p>
-            <a:pPr algn="ctr"/>
-            <a:r>
-              <a:rPr lang="en-US" dirty="0" smtClean="0">
-                <a:solidFill>
-                  <a:schemeClr val="accent1">
-                    <a:lumMod val="75000"/>
-                  </a:schemeClr>
-                </a:solidFill>
-              </a:rPr>
-              <a:t>Logging Project</a:t>
-            </a:r>
-          </a:p>
-          <a:p>
-            <a:pPr algn="ctr"/>
-            <a:r>
-              <a:rPr lang="en-US" dirty="0" smtClean="0">
-                <a:solidFill>
-                  <a:schemeClr val="accent1">
-                    <a:lumMod val="75000"/>
-                  </a:schemeClr>
-                </a:solidFill>
-              </a:rPr>
-              <a:t>(</a:t>
-            </a:r>
-            <a:r>
-              <a:rPr lang="en-US" dirty="0" smtClean="0">
-                <a:solidFill>
-                  <a:schemeClr val="accent1">
-                    <a:lumMod val="75000"/>
-                  </a:schemeClr>
-                </a:solidFill>
-              </a:rPr>
-              <a:t>Optional - Deprecated)</a:t>
-            </a:r>
-            <a:endParaRPr lang="en-US" dirty="0">
-              <a:solidFill>
-                <a:schemeClr val="accent1">
-                  <a:lumMod val="75000"/>
-                </a:schemeClr>
-              </a:solidFill>
-            </a:endParaRPr>
-          </a:p>
-        </p:txBody>
-      </p:sp>
-      <p:sp>
-        <p:nvSpPr>
-          <p:cNvPr id="7" name="Rectangle 6"/>
-          <p:cNvSpPr/>
-          <p:nvPr/>
-        </p:nvSpPr>
-        <p:spPr>
-          <a:xfrm>
-            <a:off x="5027897" y="945831"/>
-            <a:ext cx="2233396" cy="674948"/>
-          </a:xfrm>
-          <a:prstGeom prst="rect">
-            <a:avLst/>
-          </a:prstGeom>
-          <a:solidFill>
-            <a:schemeClr val="bg1"/>
-          </a:solidFill>
-        </p:spPr>
-        <p:style>
-          <a:lnRef idx="2">
-            <a:schemeClr val="accent1">
-              <a:shade val="50000"/>
-            </a:schemeClr>
-          </a:lnRef>
-          <a:fillRef idx="1">
-            <a:schemeClr val="accent1"/>
-          </a:fillRef>
-          <a:effectRef idx="0">
-            <a:schemeClr val="accent1"/>
-          </a:effectRef>
-          <a:fontRef idx="minor">
-            <a:schemeClr val="lt1"/>
-          </a:fontRef>
-        </p:style>
-        <p:txBody>
-          <a:bodyPr rtlCol="0" anchor="ctr"/>
-          <a:lstStyle/>
-          <a:p>
-            <a:pPr algn="ctr"/>
-            <a:r>
-              <a:rPr lang="en-US" dirty="0" smtClean="0">
-                <a:solidFill>
-                  <a:schemeClr val="accent1">
-                    <a:lumMod val="75000"/>
-                  </a:schemeClr>
-                </a:solidFill>
-              </a:rPr>
-              <a:t>Data Project</a:t>
-            </a:r>
-            <a:endParaRPr lang="en-US" dirty="0">
-              <a:solidFill>
-                <a:schemeClr val="accent1">
-                  <a:lumMod val="75000"/>
-                </a:schemeClr>
-              </a:solidFill>
-            </a:endParaRPr>
-          </a:p>
-        </p:txBody>
-      </p:sp>
-      <p:sp>
-        <p:nvSpPr>
           <p:cNvPr id="10" name="Flowchart: Magnetic Disk 9"/>
           <p:cNvSpPr/>
           <p:nvPr/>
         </p:nvSpPr>
         <p:spPr>
           <a:xfrm>
-            <a:off x="5201175" y="5138338"/>
+            <a:off x="9558327" y="3066029"/>
             <a:ext cx="1886042" cy="1444388"/>
           </a:xfrm>
           <a:prstGeom prst="flowChartMagneticDisk">
@@ -3382,11 +3354,13 @@
         </p:nvSpPr>
         <p:spPr>
           <a:xfrm>
-            <a:off x="4947834" y="3263778"/>
-            <a:ext cx="2442949" cy="1076812"/>
+            <a:off x="4093032" y="2930305"/>
+            <a:ext cx="3658917" cy="1715836"/>
           </a:xfrm>
           <a:prstGeom prst="roundRect">
-            <a:avLst/>
+            <a:avLst>
+              <a:gd name="adj" fmla="val 8025"/>
+            </a:avLst>
           </a:prstGeom>
           <a:solidFill>
             <a:schemeClr val="accent1">
@@ -3418,23 +3392,23 @@
           </a:fontRef>
         </p:style>
         <p:txBody>
-          <a:bodyPr rtlCol="0" anchor="ctr"/>
+          <a:bodyPr rtlCol="0" anchor="t" anchorCtr="0"/>
           <a:lstStyle/>
           <a:p>
             <a:pPr algn="ctr"/>
             <a:r>
-              <a:rPr lang="en-US" dirty="0" err="1" smtClean="0"/>
+              <a:rPr lang="en-US" sz="2400" b="1" dirty="0" err="1" smtClean="0"/>
               <a:t>REDCap</a:t>
             </a:r>
             <a:r>
-              <a:rPr lang="en-US" dirty="0"/>
+              <a:rPr lang="en-US" sz="2400" b="1" dirty="0"/>
               <a:t>-</a:t>
             </a:r>
             <a:r>
-              <a:rPr lang="en-US" smtClean="0"/>
+              <a:rPr lang="en-US" sz="2400" b="1" dirty="0" smtClean="0"/>
               <a:t>ETL</a:t>
             </a:r>
-            <a:endParaRPr lang="en-US" dirty="0"/>
+            <a:endParaRPr lang="en-US" sz="2400" b="1" dirty="0"/>
           </a:p>
         </p:txBody>
       </p:sp>
@@ -3446,7 +3420,7 @@
         </p:nvSpPr>
         <p:spPr>
           <a:xfrm>
-            <a:off x="1109658" y="3473529"/>
+            <a:off x="5079720" y="1600096"/>
             <a:ext cx="1665027" cy="645539"/>
           </a:xfrm>
           <a:prstGeom prst="rect">
@@ -3486,22 +3460,22 @@
         <p:nvCxnSpPr>
           <p:cNvPr id="13" name="Straight Arrow Connector 12"/>
           <p:cNvCxnSpPr>
-            <a:stCxn id="11" idx="0"/>
-            <a:endCxn id="7" idx="2"/>
+            <a:stCxn id="11" idx="1"/>
+            <a:endCxn id="7" idx="3"/>
           </p:cNvCxnSpPr>
           <p:nvPr/>
         </p:nvCxnSpPr>
         <p:spPr>
-          <a:xfrm flipH="1" flipV="1">
-            <a:off x="6144595" y="1620779"/>
-            <a:ext cx="24714" cy="1642999"/>
+          <a:xfrm flipH="1">
+            <a:off x="2176322" y="3788223"/>
+            <a:ext cx="1916710" cy="0"/>
           </a:xfrm>
           <a:prstGeom prst="straightConnector1">
             <a:avLst/>
           </a:prstGeom>
           <a:ln w="50800">
             <a:solidFill>
-              <a:schemeClr val="accent2">
+              <a:schemeClr val="accent6">
                 <a:lumMod val="75000"/>
               </a:schemeClr>
             </a:solidFill>
@@ -3527,20 +3501,23 @@
       <p:cxnSp>
         <p:nvCxnSpPr>
           <p:cNvPr id="17" name="Straight Arrow Connector 16"/>
-          <p:cNvCxnSpPr/>
+          <p:cNvCxnSpPr>
+            <a:stCxn id="10" idx="2"/>
+            <a:endCxn id="11" idx="3"/>
+          </p:cNvCxnSpPr>
           <p:nvPr/>
         </p:nvCxnSpPr>
         <p:spPr>
-          <a:xfrm flipH="1" flipV="1">
-            <a:off x="6186087" y="4340590"/>
-            <a:ext cx="1" cy="1080015"/>
+          <a:xfrm flipH="1">
+            <a:off x="7751949" y="3788223"/>
+            <a:ext cx="1806378" cy="0"/>
           </a:xfrm>
           <a:prstGeom prst="straightConnector1">
             <a:avLst/>
           </a:prstGeom>
           <a:ln w="50800">
             <a:solidFill>
-              <a:schemeClr val="accent2">
+              <a:schemeClr val="accent6">
                 <a:lumMod val="75000"/>
               </a:schemeClr>
             </a:solidFill>
@@ -3571,15 +3548,13 @@
         </p:nvSpPr>
         <p:spPr>
           <a:xfrm>
-            <a:off x="6249371" y="2426386"/>
+            <a:off x="2708257" y="3156276"/>
             <a:ext cx="837845" cy="491085"/>
           </a:xfrm>
           <a:prstGeom prst="rect">
             <a:avLst/>
           </a:prstGeom>
-          <a:solidFill>
-            <a:schemeClr val="bg1"/>
-          </a:solidFill>
+          <a:noFill/>
           <a:ln>
             <a:noFill/>
           </a:ln>
@@ -3608,7 +3583,7 @@
             <a:r>
               <a:rPr lang="en-US" sz="2000" b="1" dirty="0" smtClean="0">
                 <a:solidFill>
-                  <a:schemeClr val="accent2">
+                  <a:schemeClr val="accent6">
                     <a:lumMod val="75000"/>
                   </a:schemeClr>
                 </a:solidFill>
@@ -3621,7 +3596,7 @@
             <a:r>
               <a:rPr lang="en-US" sz="2000" b="1" dirty="0" smtClean="0">
                 <a:solidFill>
-                  <a:schemeClr val="accent2">
+                  <a:schemeClr val="accent6">
                     <a:lumMod val="75000"/>
                   </a:schemeClr>
                 </a:solidFill>
@@ -3630,7 +3605,7 @@
             </a:r>
             <a:endParaRPr lang="en-US" sz="2000" b="1" dirty="0">
               <a:solidFill>
-                <a:schemeClr val="accent2">
+                <a:schemeClr val="accent6">
                   <a:lumMod val="75000"/>
                 </a:schemeClr>
               </a:solidFill>
@@ -3640,59 +3615,17 @@
       </p:sp>
       <p:cxnSp>
         <p:nvCxnSpPr>
-          <p:cNvPr id="23" name="Straight Arrow Connector 22"/>
-          <p:cNvCxnSpPr>
-            <a:stCxn id="11" idx="1"/>
-            <a:endCxn id="5" idx="2"/>
-          </p:cNvCxnSpPr>
-          <p:nvPr/>
-        </p:nvCxnSpPr>
-        <p:spPr>
-          <a:xfrm rot="10800000">
-            <a:off x="3435308" y="1620780"/>
-            <a:ext cx="1512527" cy="2181404"/>
-          </a:xfrm>
-          <a:prstGeom prst="bentConnector2">
-            <a:avLst/>
-          </a:prstGeom>
-          <a:ln w="50800">
-            <a:solidFill>
-              <a:schemeClr val="accent1">
-                <a:lumMod val="75000"/>
-              </a:schemeClr>
-            </a:solidFill>
-            <a:headEnd type="triangle" w="lg" len="lg"/>
-            <a:tailEnd type="none" w="lg" len="lg"/>
-          </a:ln>
-        </p:spPr>
-        <p:style>
-          <a:lnRef idx="1">
-            <a:schemeClr val="accent1"/>
-          </a:lnRef>
-          <a:fillRef idx="0">
-            <a:schemeClr val="accent1"/>
-          </a:fillRef>
-          <a:effectRef idx="0">
-            <a:schemeClr val="accent1"/>
-          </a:effectRef>
-          <a:fontRef idx="minor">
-            <a:schemeClr val="tx1"/>
-          </a:fontRef>
-        </p:style>
-      </p:cxnSp>
-      <p:cxnSp>
-        <p:nvCxnSpPr>
           <p:cNvPr id="28" name="Straight Arrow Connector 27"/>
           <p:cNvCxnSpPr>
-            <a:stCxn id="11" idx="1"/>
-            <a:endCxn id="12" idx="3"/>
+            <a:stCxn id="11" idx="0"/>
+            <a:endCxn id="12" idx="2"/>
           </p:cNvCxnSpPr>
           <p:nvPr/>
         </p:nvCxnSpPr>
         <p:spPr>
           <a:xfrm flipH="1" flipV="1">
-            <a:off x="2774685" y="3796299"/>
-            <a:ext cx="2173149" cy="5885"/>
+            <a:off x="5912234" y="2245635"/>
+            <a:ext cx="10257" cy="684670"/>
           </a:xfrm>
           <a:prstGeom prst="straightConnector1">
             <a:avLst/>
@@ -3722,22 +3655,128 @@
           </a:fontRef>
         </p:style>
       </p:cxnSp>
+      <p:sp>
+        <p:nvSpPr>
+          <p:cNvPr id="38" name="Rectangle 37"/>
+          <p:cNvSpPr/>
+          <p:nvPr/>
+        </p:nvSpPr>
+        <p:spPr>
+          <a:xfrm>
+            <a:off x="5133614" y="4745607"/>
+            <a:ext cx="752061" cy="267698"/>
+          </a:xfrm>
+          <a:prstGeom prst="rect">
+            <a:avLst/>
+          </a:prstGeom>
+          <a:noFill/>
+          <a:ln>
+            <a:noFill/>
+          </a:ln>
+        </p:spPr>
+        <p:style>
+          <a:lnRef idx="2">
+            <a:schemeClr val="accent1">
+              <a:shade val="50000"/>
+            </a:schemeClr>
+          </a:lnRef>
+          <a:fillRef idx="1">
+            <a:schemeClr val="accent1"/>
+          </a:fillRef>
+          <a:effectRef idx="0">
+            <a:schemeClr val="accent1"/>
+          </a:effectRef>
+          <a:fontRef idx="minor">
+            <a:schemeClr val="lt1"/>
+          </a:fontRef>
+        </p:style>
+        <p:txBody>
+          <a:bodyPr lIns="0" rIns="0" rtlCol="0" anchor="ctr"/>
+          <a:lstStyle/>
+          <a:p>
+            <a:pPr algn="ctr"/>
+            <a:r>
+              <a:rPr lang="en-US" sz="2000" b="1" dirty="0" smtClean="0">
+                <a:solidFill>
+                  <a:schemeClr val="bg2">
+                    <a:lumMod val="50000"/>
+                  </a:schemeClr>
+                </a:solidFill>
+              </a:rPr>
+              <a:t>Log</a:t>
+            </a:r>
+            <a:endParaRPr lang="en-US" sz="2000" b="1" dirty="0">
+              <a:solidFill>
+                <a:schemeClr val="bg2">
+                  <a:lumMod val="50000"/>
+                </a:schemeClr>
+              </a:solidFill>
+            </a:endParaRPr>
+          </a:p>
+        </p:txBody>
+      </p:sp>
+      <p:sp>
+        <p:nvSpPr>
+          <p:cNvPr id="39" name="Rectangle 38"/>
+          <p:cNvSpPr/>
+          <p:nvPr/>
+        </p:nvSpPr>
+        <p:spPr>
+          <a:xfrm>
+            <a:off x="4220648" y="5535601"/>
+            <a:ext cx="1665027" cy="795059"/>
+          </a:xfrm>
+          <a:prstGeom prst="rect">
+            <a:avLst/>
+          </a:prstGeom>
+        </p:spPr>
+        <p:style>
+          <a:lnRef idx="2">
+            <a:schemeClr val="accent1">
+              <a:shade val="50000"/>
+            </a:schemeClr>
+          </a:lnRef>
+          <a:fillRef idx="1">
+            <a:schemeClr val="accent1"/>
+          </a:fillRef>
+          <a:effectRef idx="0">
+            <a:schemeClr val="accent1"/>
+          </a:effectRef>
+          <a:fontRef idx="minor">
+            <a:schemeClr val="lt1"/>
+          </a:fontRef>
+        </p:style>
+        <p:txBody>
+          <a:bodyPr rtlCol="0" anchor="ctr"/>
+          <a:lstStyle/>
+          <a:p>
+            <a:pPr algn="ctr"/>
+            <a:r>
+              <a:rPr lang="en-US" dirty="0" smtClean="0"/>
+              <a:t>Log File (Optional)</a:t>
+            </a:r>
+            <a:endParaRPr lang="en-US" dirty="0"/>
+          </a:p>
+        </p:txBody>
+      </p:sp>
       <p:cxnSp>
         <p:nvCxnSpPr>
-          <p:cNvPr id="31" name="Straight Arrow Connector 22"/>
+          <p:cNvPr id="40" name="Straight Arrow Connector 39"/>
           <p:cNvCxnSpPr>
-            <a:stCxn id="6" idx="2"/>
-            <a:endCxn id="11" idx="3"/>
+            <a:stCxn id="39" idx="0"/>
+            <a:endCxn id="11" idx="2"/>
           </p:cNvCxnSpPr>
           <p:nvPr/>
         </p:nvCxnSpPr>
         <p:spPr>
-          <a:xfrm rot="5400000">
-            <a:off x="7049452" y="1962111"/>
-            <a:ext cx="2181405" cy="1498741"/>
+          <a:xfrm rot="5400000" flipH="1" flipV="1">
+            <a:off x="5043096" y="4656207"/>
+            <a:ext cx="889460" cy="869329"/>
           </a:xfrm>
-          <a:prstGeom prst="bentConnector2">
-            <a:avLst/>
+          <a:prstGeom prst="bentConnector3">
+            <a:avLst>
+              <a:gd name="adj1" fmla="val 50000"/>
+            </a:avLst>
           </a:prstGeom>
           <a:ln w="50800">
             <a:solidFill>
@@ -3766,162 +3805,14 @@
       </p:cxnSp>
       <p:sp>
         <p:nvSpPr>
-          <p:cNvPr id="38" name="Rectangle 37"/>
-          <p:cNvSpPr/>
-          <p:nvPr/>
-        </p:nvSpPr>
-        <p:spPr>
-          <a:xfrm>
-            <a:off x="7996123" y="3424733"/>
-            <a:ext cx="752061" cy="267698"/>
-          </a:xfrm>
-          <a:prstGeom prst="rect">
-            <a:avLst/>
-          </a:prstGeom>
-          <a:solidFill>
-            <a:schemeClr val="bg1"/>
-          </a:solidFill>
-          <a:ln>
-            <a:noFill/>
-          </a:ln>
-        </p:spPr>
-        <p:style>
-          <a:lnRef idx="2">
-            <a:schemeClr val="accent1">
-              <a:shade val="50000"/>
-            </a:schemeClr>
-          </a:lnRef>
-          <a:fillRef idx="1">
-            <a:schemeClr val="accent1"/>
-          </a:fillRef>
-          <a:effectRef idx="0">
-            <a:schemeClr val="accent1"/>
-          </a:effectRef>
-          <a:fontRef idx="minor">
-            <a:schemeClr val="lt1"/>
-          </a:fontRef>
-        </p:style>
-        <p:txBody>
-          <a:bodyPr lIns="0" rIns="0" rtlCol="0" anchor="ctr"/>
-          <a:lstStyle/>
-          <a:p>
-            <a:pPr algn="ctr"/>
-            <a:r>
-              <a:rPr lang="en-US" sz="2000" b="1" dirty="0" smtClean="0">
-                <a:solidFill>
-                  <a:schemeClr val="bg2">
-                    <a:lumMod val="50000"/>
-                  </a:schemeClr>
-                </a:solidFill>
-              </a:rPr>
-              <a:t>Log</a:t>
-            </a:r>
-            <a:endParaRPr lang="en-US" sz="2000" b="1" dirty="0">
-              <a:solidFill>
-                <a:schemeClr val="bg2">
-                  <a:lumMod val="50000"/>
-                </a:schemeClr>
-              </a:solidFill>
-            </a:endParaRPr>
-          </a:p>
-        </p:txBody>
-      </p:sp>
-      <p:sp>
-        <p:nvSpPr>
-          <p:cNvPr id="39" name="Rectangle 38"/>
-          <p:cNvSpPr/>
-          <p:nvPr/>
-        </p:nvSpPr>
-        <p:spPr>
-          <a:xfrm>
-            <a:off x="9833732" y="3409521"/>
-            <a:ext cx="1665027" cy="795059"/>
-          </a:xfrm>
-          <a:prstGeom prst="rect">
-            <a:avLst/>
-          </a:prstGeom>
-        </p:spPr>
-        <p:style>
-          <a:lnRef idx="2">
-            <a:schemeClr val="accent1">
-              <a:shade val="50000"/>
-            </a:schemeClr>
-          </a:lnRef>
-          <a:fillRef idx="1">
-            <a:schemeClr val="accent1"/>
-          </a:fillRef>
-          <a:effectRef idx="0">
-            <a:schemeClr val="accent1"/>
-          </a:effectRef>
-          <a:fontRef idx="minor">
-            <a:schemeClr val="lt1"/>
-          </a:fontRef>
-        </p:style>
-        <p:txBody>
-          <a:bodyPr rtlCol="0" anchor="ctr"/>
-          <a:lstStyle/>
-          <a:p>
-            <a:pPr algn="ctr"/>
-            <a:r>
-              <a:rPr lang="en-US" dirty="0" smtClean="0"/>
-              <a:t>Log File (Optional)</a:t>
-            </a:r>
-            <a:endParaRPr lang="en-US" dirty="0"/>
-          </a:p>
-        </p:txBody>
-      </p:sp>
-      <p:cxnSp>
-        <p:nvCxnSpPr>
-          <p:cNvPr id="40" name="Straight Arrow Connector 39"/>
-          <p:cNvCxnSpPr>
-            <a:stCxn id="39" idx="1"/>
-            <a:endCxn id="11" idx="3"/>
-          </p:cNvCxnSpPr>
-          <p:nvPr/>
-        </p:nvCxnSpPr>
-        <p:spPr>
-          <a:xfrm flipH="1" flipV="1">
-            <a:off x="7390783" y="3802184"/>
-            <a:ext cx="2442949" cy="4867"/>
-          </a:xfrm>
-          <a:prstGeom prst="straightConnector1">
-            <a:avLst/>
-          </a:prstGeom>
-          <a:ln w="50800">
-            <a:solidFill>
-              <a:schemeClr val="bg2">
-                <a:lumMod val="50000"/>
-              </a:schemeClr>
-            </a:solidFill>
-            <a:headEnd type="triangle" w="lg" len="lg"/>
-            <a:tailEnd type="none" w="lg" len="lg"/>
-          </a:ln>
-        </p:spPr>
-        <p:style>
-          <a:lnRef idx="1">
-            <a:schemeClr val="accent1"/>
-          </a:lnRef>
-          <a:fillRef idx="0">
-            <a:schemeClr val="accent1"/>
-          </a:fillRef>
-          <a:effectRef idx="0">
-            <a:schemeClr val="accent1"/>
-          </a:effectRef>
-          <a:fontRef idx="minor">
-            <a:schemeClr val="tx1"/>
-          </a:fontRef>
-        </p:style>
-      </p:cxnSp>
-      <p:sp>
-        <p:nvSpPr>
           <p:cNvPr id="44" name="Rounded Rectangle 43"/>
           <p:cNvSpPr/>
           <p:nvPr/>
         </p:nvSpPr>
         <p:spPr>
           <a:xfrm>
-            <a:off x="10070863" y="4728625"/>
-            <a:ext cx="1881091" cy="748613"/>
+            <a:off x="6140862" y="5535601"/>
+            <a:ext cx="1881091" cy="795059"/>
           </a:xfrm>
           <a:prstGeom prst="roundRect">
             <a:avLst/>
@@ -3979,18 +3870,19 @@
         <p:nvCxnSpPr>
           <p:cNvPr id="45" name="Straight Arrow Connector 22"/>
           <p:cNvCxnSpPr>
-            <a:stCxn id="44" idx="1"/>
+            <a:stCxn id="44" idx="0"/>
+            <a:endCxn id="11" idx="2"/>
           </p:cNvCxnSpPr>
           <p:nvPr/>
         </p:nvCxnSpPr>
         <p:spPr>
-          <a:xfrm rot="10800000">
-            <a:off x="7397221" y="4051884"/>
-            <a:ext cx="2673643" cy="1051049"/>
+          <a:xfrm rot="16200000" flipV="1">
+            <a:off x="6057220" y="4511412"/>
+            <a:ext cx="889460" cy="1158917"/>
           </a:xfrm>
           <a:prstGeom prst="bentConnector3">
             <a:avLst>
-              <a:gd name="adj1" fmla="val 80122"/>
+              <a:gd name="adj1" fmla="val 50000"/>
             </a:avLst>
           </a:prstGeom>
           <a:ln w="50800">
@@ -4024,15 +3916,13 @@
         </p:nvSpPr>
         <p:spPr>
           <a:xfrm>
-            <a:off x="8015096" y="4725383"/>
+            <a:off x="6074536" y="4724041"/>
             <a:ext cx="1809424" cy="277730"/>
           </a:xfrm>
           <a:prstGeom prst="rect">
             <a:avLst/>
           </a:prstGeom>
-          <a:solidFill>
-            <a:schemeClr val="bg1"/>
-          </a:solidFill>
+          <a:noFill/>
           <a:ln>
             <a:noFill/>
           </a:ln>
@@ -4074,448 +3964,6 @@
           </a:p>
         </p:txBody>
       </p:sp>
-      <p:sp>
-        <p:nvSpPr>
-          <p:cNvPr id="65" name="Rectangle 64"/>
-          <p:cNvSpPr/>
-          <p:nvPr/>
-        </p:nvSpPr>
-        <p:spPr>
-          <a:xfrm>
-            <a:off x="3068246" y="3865548"/>
-            <a:ext cx="1458294" cy="588645"/>
-          </a:xfrm>
-          <a:prstGeom prst="rect">
-            <a:avLst/>
-          </a:prstGeom>
-          <a:solidFill>
-            <a:schemeClr val="bg1"/>
-          </a:solidFill>
-          <a:ln>
-            <a:noFill/>
-          </a:ln>
-        </p:spPr>
-        <p:style>
-          <a:lnRef idx="2">
-            <a:schemeClr val="accent1">
-              <a:shade val="50000"/>
-            </a:schemeClr>
-          </a:lnRef>
-          <a:fillRef idx="1">
-            <a:schemeClr val="accent1"/>
-          </a:fillRef>
-          <a:effectRef idx="0">
-            <a:schemeClr val="accent1"/>
-          </a:effectRef>
-          <a:fontRef idx="minor">
-            <a:schemeClr val="lt1"/>
-          </a:fontRef>
-        </p:style>
-        <p:txBody>
-          <a:bodyPr lIns="0" rIns="0" rtlCol="0" anchor="ctr"/>
-          <a:lstStyle/>
-          <a:p>
-            <a:pPr algn="ctr"/>
-            <a:r>
-              <a:rPr lang="en-US" sz="2000" b="1" dirty="0" smtClean="0">
-                <a:solidFill>
-                  <a:schemeClr val="accent1">
-                    <a:lumMod val="75000"/>
-                  </a:schemeClr>
-                </a:solidFill>
-              </a:rPr>
-              <a:t>Get Configuration</a:t>
-            </a:r>
-            <a:endParaRPr lang="en-US" sz="2000" b="1" dirty="0">
-              <a:solidFill>
-                <a:schemeClr val="accent1">
-                  <a:lumMod val="75000"/>
-                </a:schemeClr>
-              </a:solidFill>
-            </a:endParaRPr>
-          </a:p>
-        </p:txBody>
-      </p:sp>
-      <p:sp>
-        <p:nvSpPr>
-          <p:cNvPr id="24" name="Rounded Rectangle 23"/>
-          <p:cNvSpPr/>
-          <p:nvPr/>
-        </p:nvSpPr>
-        <p:spPr>
-          <a:xfrm>
-            <a:off x="813732" y="4843846"/>
-            <a:ext cx="2731708" cy="1564106"/>
-          </a:xfrm>
-          <a:prstGeom prst="roundRect">
-            <a:avLst/>
-          </a:prstGeom>
-          <a:solidFill>
-            <a:schemeClr val="accent1">
-              <a:lumMod val="40000"/>
-              <a:lumOff val="60000"/>
-            </a:schemeClr>
-          </a:solidFill>
-          <a:ln w="25400"/>
-        </p:spPr>
-        <p:style>
-          <a:lnRef idx="2">
-            <a:schemeClr val="accent1">
-              <a:shade val="50000"/>
-            </a:schemeClr>
-          </a:lnRef>
-          <a:fillRef idx="1">
-            <a:schemeClr val="accent1"/>
-          </a:fillRef>
-          <a:effectRef idx="0">
-            <a:schemeClr val="accent1"/>
-          </a:effectRef>
-          <a:fontRef idx="minor">
-            <a:schemeClr val="lt1"/>
-          </a:fontRef>
-        </p:style>
-        <p:txBody>
-          <a:bodyPr rtlCol="0" anchor="t"/>
-          <a:lstStyle/>
-          <a:p>
-            <a:pPr algn="ctr"/>
-            <a:r>
-              <a:rPr lang="en-US" sz="2400" b="1" dirty="0" smtClean="0">
-                <a:solidFill>
-                  <a:schemeClr val="accent1">
-                    <a:lumMod val="50000"/>
-                  </a:schemeClr>
-                </a:solidFill>
-              </a:rPr>
-              <a:t>Web Server</a:t>
-            </a:r>
-          </a:p>
-          <a:p>
-            <a:pPr algn="ctr"/>
-            <a:r>
-              <a:rPr lang="en-US" b="1" dirty="0" smtClean="0">
-                <a:solidFill>
-                  <a:schemeClr val="accent1">
-                    <a:lumMod val="50000"/>
-                  </a:schemeClr>
-                </a:solidFill>
-              </a:rPr>
-              <a:t>(</a:t>
-            </a:r>
-            <a:r>
-              <a:rPr lang="en-US" b="1" dirty="0" smtClean="0">
-                <a:solidFill>
-                  <a:schemeClr val="accent1">
-                    <a:lumMod val="50000"/>
-                  </a:schemeClr>
-                </a:solidFill>
-              </a:rPr>
-              <a:t>Optional - Deprecated)</a:t>
-            </a:r>
-            <a:endParaRPr lang="en-US" b="1" dirty="0">
-              <a:solidFill>
-                <a:schemeClr val="accent1">
-                  <a:lumMod val="50000"/>
-                </a:schemeClr>
-              </a:solidFill>
-            </a:endParaRPr>
-          </a:p>
-        </p:txBody>
-      </p:sp>
-      <p:cxnSp>
-        <p:nvCxnSpPr>
-          <p:cNvPr id="25" name="Straight Arrow Connector 22"/>
-          <p:cNvCxnSpPr>
-            <a:stCxn id="33" idx="1"/>
-            <a:endCxn id="5" idx="1"/>
-          </p:cNvCxnSpPr>
-          <p:nvPr/>
-        </p:nvCxnSpPr>
-        <p:spPr>
-          <a:xfrm rot="10800000" flipH="1">
-            <a:off x="1367867" y="1283306"/>
-            <a:ext cx="871994" cy="4783056"/>
-          </a:xfrm>
-          <a:prstGeom prst="bentConnector3">
-            <a:avLst>
-              <a:gd name="adj1" fmla="val -114725"/>
-            </a:avLst>
-          </a:prstGeom>
-          <a:ln w="50800">
-            <a:solidFill>
-              <a:schemeClr val="accent6">
-                <a:lumMod val="75000"/>
-              </a:schemeClr>
-            </a:solidFill>
-            <a:headEnd type="triangle" w="lg" len="lg"/>
-            <a:tailEnd type="none" w="lg" len="lg"/>
-          </a:ln>
-        </p:spPr>
-        <p:style>
-          <a:lnRef idx="1">
-            <a:schemeClr val="accent1"/>
-          </a:lnRef>
-          <a:fillRef idx="0">
-            <a:schemeClr val="accent1"/>
-          </a:fillRef>
-          <a:effectRef idx="0">
-            <a:schemeClr val="accent1"/>
-          </a:effectRef>
-          <a:fontRef idx="minor">
-            <a:schemeClr val="tx1"/>
-          </a:fontRef>
-        </p:style>
-      </p:cxnSp>
-      <p:sp>
-        <p:nvSpPr>
-          <p:cNvPr id="33" name="Rectangle 32"/>
-          <p:cNvSpPr/>
-          <p:nvPr/>
-        </p:nvSpPr>
-        <p:spPr>
-          <a:xfrm>
-            <a:off x="1367867" y="5852437"/>
-            <a:ext cx="1611973" cy="427850"/>
-          </a:xfrm>
-          <a:prstGeom prst="rect">
-            <a:avLst/>
-          </a:prstGeom>
-          <a:solidFill>
-            <a:schemeClr val="bg1"/>
-          </a:solidFill>
-        </p:spPr>
-        <p:style>
-          <a:lnRef idx="2">
-            <a:schemeClr val="accent1">
-              <a:shade val="50000"/>
-            </a:schemeClr>
-          </a:lnRef>
-          <a:fillRef idx="1">
-            <a:schemeClr val="accent1"/>
-          </a:fillRef>
-          <a:effectRef idx="0">
-            <a:schemeClr val="accent1"/>
-          </a:effectRef>
-          <a:fontRef idx="minor">
-            <a:schemeClr val="lt1"/>
-          </a:fontRef>
-        </p:style>
-        <p:txBody>
-          <a:bodyPr rtlCol="0" anchor="ctr"/>
-          <a:lstStyle/>
-          <a:p>
-            <a:pPr algn="ctr"/>
-            <a:r>
-              <a:rPr lang="en-US" dirty="0" smtClean="0">
-                <a:solidFill>
-                  <a:schemeClr val="accent1">
-                    <a:lumMod val="75000"/>
-                  </a:schemeClr>
-                </a:solidFill>
-              </a:rPr>
-              <a:t>DET Web Script</a:t>
-            </a:r>
-            <a:endParaRPr lang="en-US" dirty="0">
-              <a:solidFill>
-                <a:schemeClr val="accent1">
-                  <a:lumMod val="75000"/>
-                </a:schemeClr>
-              </a:solidFill>
-            </a:endParaRPr>
-          </a:p>
-        </p:txBody>
-      </p:sp>
-      <p:sp>
-        <p:nvSpPr>
-          <p:cNvPr id="37" name="Rectangle 36"/>
-          <p:cNvSpPr/>
-          <p:nvPr/>
-        </p:nvSpPr>
-        <p:spPr>
-          <a:xfrm>
-            <a:off x="488768" y="1961917"/>
-            <a:ext cx="1299079" cy="978647"/>
-          </a:xfrm>
-          <a:prstGeom prst="rect">
-            <a:avLst/>
-          </a:prstGeom>
-          <a:solidFill>
-            <a:schemeClr val="bg1"/>
-          </a:solidFill>
-          <a:ln>
-            <a:noFill/>
-          </a:ln>
-        </p:spPr>
-        <p:style>
-          <a:lnRef idx="2">
-            <a:schemeClr val="accent1">
-              <a:shade val="50000"/>
-            </a:schemeClr>
-          </a:lnRef>
-          <a:fillRef idx="1">
-            <a:schemeClr val="accent1"/>
-          </a:fillRef>
-          <a:effectRef idx="0">
-            <a:schemeClr val="accent1"/>
-          </a:effectRef>
-          <a:fontRef idx="minor">
-            <a:schemeClr val="lt1"/>
-          </a:fontRef>
-        </p:style>
-        <p:txBody>
-          <a:bodyPr lIns="0" rIns="0" rtlCol="0" anchor="ctr"/>
-          <a:lstStyle/>
-          <a:p>
-            <a:pPr algn="ctr"/>
-            <a:r>
-              <a:rPr lang="en-US" sz="2000" b="1" dirty="0" smtClean="0">
-                <a:solidFill>
-                  <a:schemeClr val="accent6">
-                    <a:lumMod val="75000"/>
-                  </a:schemeClr>
-                </a:solidFill>
-              </a:rPr>
-              <a:t>DET </a:t>
-            </a:r>
-          </a:p>
-          <a:p>
-            <a:pPr algn="ctr"/>
-            <a:r>
-              <a:rPr lang="en-US" sz="2000" b="1" dirty="0" smtClean="0">
-                <a:solidFill>
-                  <a:schemeClr val="accent6">
-                    <a:lumMod val="75000"/>
-                  </a:schemeClr>
-                </a:solidFill>
-              </a:rPr>
-              <a:t>(Data Entry</a:t>
-            </a:r>
-          </a:p>
-          <a:p>
-            <a:pPr algn="ctr"/>
-            <a:r>
-              <a:rPr lang="en-US" sz="2000" b="1" dirty="0" smtClean="0">
-                <a:solidFill>
-                  <a:schemeClr val="accent6">
-                    <a:lumMod val="75000"/>
-                  </a:schemeClr>
-                </a:solidFill>
-              </a:rPr>
-              <a:t> Trigger) </a:t>
-            </a:r>
-            <a:endParaRPr lang="en-US" sz="2000" b="1" dirty="0">
-              <a:solidFill>
-                <a:schemeClr val="accent6">
-                  <a:lumMod val="75000"/>
-                </a:schemeClr>
-              </a:solidFill>
-            </a:endParaRPr>
-          </a:p>
-        </p:txBody>
-      </p:sp>
-      <p:cxnSp>
-        <p:nvCxnSpPr>
-          <p:cNvPr id="41" name="Straight Arrow Connector 40"/>
-          <p:cNvCxnSpPr>
-            <a:endCxn id="33" idx="3"/>
-          </p:cNvCxnSpPr>
-          <p:nvPr/>
-        </p:nvCxnSpPr>
-        <p:spPr>
-          <a:xfrm flipH="1">
-            <a:off x="2979840" y="4305440"/>
-            <a:ext cx="2048058" cy="1760922"/>
-          </a:xfrm>
-          <a:prstGeom prst="straightConnector1">
-            <a:avLst/>
-          </a:prstGeom>
-          <a:ln w="50800">
-            <a:solidFill>
-              <a:schemeClr val="accent6">
-                <a:lumMod val="75000"/>
-              </a:schemeClr>
-            </a:solidFill>
-            <a:headEnd type="triangle" w="lg" len="lg"/>
-            <a:tailEnd type="none" w="lg" len="lg"/>
-          </a:ln>
-        </p:spPr>
-        <p:style>
-          <a:lnRef idx="1">
-            <a:schemeClr val="accent1"/>
-          </a:lnRef>
-          <a:fillRef idx="0">
-            <a:schemeClr val="accent1"/>
-          </a:fillRef>
-          <a:effectRef idx="0">
-            <a:schemeClr val="accent1"/>
-          </a:effectRef>
-          <a:fontRef idx="minor">
-            <a:schemeClr val="tx1"/>
-          </a:fontRef>
-        </p:style>
-      </p:cxnSp>
-      <p:sp>
-        <p:nvSpPr>
-          <p:cNvPr id="42" name="Rectangle 41"/>
-          <p:cNvSpPr/>
-          <p:nvPr/>
-        </p:nvSpPr>
-        <p:spPr>
-          <a:xfrm>
-            <a:off x="3940244" y="5340264"/>
-            <a:ext cx="458407" cy="267698"/>
-          </a:xfrm>
-          <a:prstGeom prst="rect">
-            <a:avLst/>
-          </a:prstGeom>
-          <a:solidFill>
-            <a:schemeClr val="bg1"/>
-          </a:solidFill>
-          <a:ln>
-            <a:noFill/>
-          </a:ln>
-        </p:spPr>
-        <p:style>
-          <a:lnRef idx="2">
-            <a:schemeClr val="accent1">
-              <a:shade val="50000"/>
-            </a:schemeClr>
-          </a:lnRef>
-          <a:fillRef idx="1">
-            <a:schemeClr val="accent1"/>
-          </a:fillRef>
-          <a:effectRef idx="0">
-            <a:schemeClr val="accent1"/>
-          </a:effectRef>
-          <a:fontRef idx="minor">
-            <a:schemeClr val="lt1"/>
-          </a:fontRef>
-        </p:style>
-        <p:txBody>
-          <a:bodyPr lIns="0" rIns="0" rtlCol="0" anchor="ctr"/>
-          <a:lstStyle/>
-          <a:p>
-            <a:pPr algn="ctr"/>
-            <a:r>
-              <a:rPr lang="en-US" sz="2000" b="1" dirty="0" smtClean="0">
-                <a:solidFill>
-                  <a:schemeClr val="accent6">
-                    <a:lumMod val="75000"/>
-                  </a:schemeClr>
-                </a:solidFill>
-              </a:rPr>
-              <a:t>Run</a:t>
-            </a:r>
-            <a:endParaRPr lang="en-US" sz="2000" b="1" dirty="0">
-              <a:solidFill>
-                <a:schemeClr val="accent6">
-                  <a:lumMod val="75000"/>
-                </a:schemeClr>
-              </a:solidFill>
-            </a:endParaRPr>
-          </a:p>
-        </p:txBody>
-      </p:sp>
       <p:cxnSp>
         <p:nvCxnSpPr>
           <p:cNvPr id="43" name="Straight Arrow Connector 42"/>
@@ -4523,9 +3971,9 @@
           <p:nvPr/>
         </p:nvCxnSpPr>
         <p:spPr>
-          <a:xfrm flipH="1" flipV="1">
-            <a:off x="5767877" y="4345457"/>
-            <a:ext cx="16969" cy="1071945"/>
+          <a:xfrm flipH="1">
+            <a:off x="7751949" y="4109603"/>
+            <a:ext cx="1806378" cy="0"/>
           </a:xfrm>
           <a:prstGeom prst="straightConnector1">
             <a:avLst/>
@@ -4555,68 +4003,6 @@
           </a:fontRef>
         </p:style>
       </p:cxnSp>
-      <p:sp>
-        <p:nvSpPr>
-          <p:cNvPr id="46" name="Rectangle 45"/>
-          <p:cNvSpPr/>
-          <p:nvPr/>
-        </p:nvSpPr>
-        <p:spPr>
-          <a:xfrm>
-            <a:off x="5205244" y="4541398"/>
-            <a:ext cx="500527" cy="307758"/>
-          </a:xfrm>
-          <a:prstGeom prst="rect">
-            <a:avLst/>
-          </a:prstGeom>
-          <a:solidFill>
-            <a:schemeClr val="bg1"/>
-          </a:solidFill>
-          <a:ln>
-            <a:noFill/>
-          </a:ln>
-        </p:spPr>
-        <p:style>
-          <a:lnRef idx="2">
-            <a:schemeClr val="accent1">
-              <a:shade val="50000"/>
-            </a:schemeClr>
-          </a:lnRef>
-          <a:fillRef idx="1">
-            <a:schemeClr val="accent1"/>
-          </a:fillRef>
-          <a:effectRef idx="0">
-            <a:schemeClr val="accent1"/>
-          </a:effectRef>
-          <a:fontRef idx="minor">
-            <a:schemeClr val="lt1"/>
-          </a:fontRef>
-        </p:style>
-        <p:txBody>
-          <a:bodyPr lIns="0" rIns="0" rtlCol="0" anchor="ctr"/>
-          <a:lstStyle/>
-          <a:p>
-            <a:pPr algn="ctr"/>
-            <a:r>
-              <a:rPr lang="en-US" sz="2000" b="1" dirty="0" smtClean="0">
-                <a:solidFill>
-                  <a:schemeClr val="bg2">
-                    <a:lumMod val="50000"/>
-                  </a:schemeClr>
-                </a:solidFill>
-              </a:rPr>
-              <a:t>Log</a:t>
-            </a:r>
-            <a:endParaRPr lang="en-US" sz="2000" b="1" dirty="0">
-              <a:solidFill>
-                <a:schemeClr val="bg2">
-                  <a:lumMod val="50000"/>
-                </a:schemeClr>
-              </a:solidFill>
-            </a:endParaRPr>
-          </a:p>
-        </p:txBody>
-      </p:sp>
     </p:spTree>
     <p:extLst>
       <p:ext uri="{BB962C8B-B14F-4D97-AF65-F5344CB8AC3E}">

</xml_diff>

<commit_message>
Updated dependencies, including REDCap-ETL to 1.3.0
</commit_message>
<xml_diff>
--- a/dependencies/iu-redcap/redcap-etl/docs/etl-process.pptx
+++ b/dependencies/iu-redcap/redcap-etl/docs/etl-process.pptx
@@ -243,7 +243,7 @@
           <a:p>
             <a:fld id="{B44A8295-E98B-4C13-8791-4EE2BD1A3C5E}" type="datetimeFigureOut">
               <a:rPr lang="en-US" smtClean="0"/>
-              <a:t>4/2/2019</a:t>
+              <a:t>10/1/2019</a:t>
             </a:fld>
             <a:endParaRPr lang="en-US"/>
           </a:p>
@@ -413,7 +413,7 @@
           <a:p>
             <a:fld id="{B44A8295-E98B-4C13-8791-4EE2BD1A3C5E}" type="datetimeFigureOut">
               <a:rPr lang="en-US" smtClean="0"/>
-              <a:t>4/2/2019</a:t>
+              <a:t>10/1/2019</a:t>
             </a:fld>
             <a:endParaRPr lang="en-US"/>
           </a:p>
@@ -593,7 +593,7 @@
           <a:p>
             <a:fld id="{B44A8295-E98B-4C13-8791-4EE2BD1A3C5E}" type="datetimeFigureOut">
               <a:rPr lang="en-US" smtClean="0"/>
-              <a:t>4/2/2019</a:t>
+              <a:t>10/1/2019</a:t>
             </a:fld>
             <a:endParaRPr lang="en-US"/>
           </a:p>
@@ -763,7 +763,7 @@
           <a:p>
             <a:fld id="{B44A8295-E98B-4C13-8791-4EE2BD1A3C5E}" type="datetimeFigureOut">
               <a:rPr lang="en-US" smtClean="0"/>
-              <a:t>4/2/2019</a:t>
+              <a:t>10/1/2019</a:t>
             </a:fld>
             <a:endParaRPr lang="en-US"/>
           </a:p>
@@ -1009,7 +1009,7 @@
           <a:p>
             <a:fld id="{B44A8295-E98B-4C13-8791-4EE2BD1A3C5E}" type="datetimeFigureOut">
               <a:rPr lang="en-US" smtClean="0"/>
-              <a:t>4/2/2019</a:t>
+              <a:t>10/1/2019</a:t>
             </a:fld>
             <a:endParaRPr lang="en-US"/>
           </a:p>
@@ -1241,7 +1241,7 @@
           <a:p>
             <a:fld id="{B44A8295-E98B-4C13-8791-4EE2BD1A3C5E}" type="datetimeFigureOut">
               <a:rPr lang="en-US" smtClean="0"/>
-              <a:t>4/2/2019</a:t>
+              <a:t>10/1/2019</a:t>
             </a:fld>
             <a:endParaRPr lang="en-US"/>
           </a:p>
@@ -1608,7 +1608,7 @@
           <a:p>
             <a:fld id="{B44A8295-E98B-4C13-8791-4EE2BD1A3C5E}" type="datetimeFigureOut">
               <a:rPr lang="en-US" smtClean="0"/>
-              <a:t>4/2/2019</a:t>
+              <a:t>10/1/2019</a:t>
             </a:fld>
             <a:endParaRPr lang="en-US"/>
           </a:p>
@@ -1726,7 +1726,7 @@
           <a:p>
             <a:fld id="{B44A8295-E98B-4C13-8791-4EE2BD1A3C5E}" type="datetimeFigureOut">
               <a:rPr lang="en-US" smtClean="0"/>
-              <a:t>4/2/2019</a:t>
+              <a:t>10/1/2019</a:t>
             </a:fld>
             <a:endParaRPr lang="en-US"/>
           </a:p>
@@ -1821,7 +1821,7 @@
           <a:p>
             <a:fld id="{B44A8295-E98B-4C13-8791-4EE2BD1A3C5E}" type="datetimeFigureOut">
               <a:rPr lang="en-US" smtClean="0"/>
-              <a:t>4/2/2019</a:t>
+              <a:t>10/1/2019</a:t>
             </a:fld>
             <a:endParaRPr lang="en-US"/>
           </a:p>
@@ -2098,7 +2098,7 @@
           <a:p>
             <a:fld id="{B44A8295-E98B-4C13-8791-4EE2BD1A3C5E}" type="datetimeFigureOut">
               <a:rPr lang="en-US" smtClean="0"/>
-              <a:t>4/2/2019</a:t>
+              <a:t>10/1/2019</a:t>
             </a:fld>
             <a:endParaRPr lang="en-US"/>
           </a:p>
@@ -2351,7 +2351,7 @@
           <a:p>
             <a:fld id="{B44A8295-E98B-4C13-8791-4EE2BD1A3C5E}" type="datetimeFigureOut">
               <a:rPr lang="en-US" smtClean="0"/>
-              <a:t>4/2/2019</a:t>
+              <a:t>10/1/2019</a:t>
             </a:fld>
             <a:endParaRPr lang="en-US"/>
           </a:p>
@@ -2564,7 +2564,7 @@
           <a:p>
             <a:fld id="{B44A8295-E98B-4C13-8791-4EE2BD1A3C5E}" type="datetimeFigureOut">
               <a:rPr lang="en-US" smtClean="0"/>
-              <a:t>4/2/2019</a:t>
+              <a:t>10/1/2019</a:t>
             </a:fld>
             <a:endParaRPr lang="en-US"/>
           </a:p>
@@ -2971,21 +2971,95 @@
       </p:grpSpPr>
       <p:sp>
         <p:nvSpPr>
-          <p:cNvPr id="22" name="Rectangle 21"/>
+          <p:cNvPr id="87" name="Rounded Rectangle 86"/>
           <p:cNvSpPr/>
           <p:nvPr/>
         </p:nvSpPr>
         <p:spPr>
           <a:xfrm>
-            <a:off x="6179650" y="4420931"/>
-            <a:ext cx="770339" cy="568168"/>
+            <a:off x="3670397" y="873760"/>
+            <a:ext cx="4483674" cy="5669280"/>
+          </a:xfrm>
+          <a:prstGeom prst="roundRect">
+            <a:avLst>
+              <a:gd name="adj" fmla="val 4095"/>
+            </a:avLst>
+          </a:prstGeom>
+          <a:solidFill>
+            <a:schemeClr val="accent1">
+              <a:alpha val="16000"/>
+            </a:schemeClr>
+          </a:solidFill>
+          <a:ln w="25400">
+            <a:prstDash val="sysDash"/>
+          </a:ln>
+        </p:spPr>
+        <p:style>
+          <a:lnRef idx="2">
+            <a:schemeClr val="accent1">
+              <a:shade val="50000"/>
+            </a:schemeClr>
+          </a:lnRef>
+          <a:fillRef idx="1">
+            <a:schemeClr val="accent1"/>
+          </a:fillRef>
+          <a:effectRef idx="0">
+            <a:schemeClr val="accent1"/>
+          </a:effectRef>
+          <a:fontRef idx="minor">
+            <a:schemeClr val="lt1"/>
+          </a:fontRef>
+        </p:style>
+        <p:txBody>
+          <a:bodyPr rtlCol="0" anchor="t" anchorCtr="0"/>
+          <a:lstStyle/>
+          <a:p>
+            <a:pPr algn="ctr"/>
+            <a:r>
+              <a:rPr lang="en-US" b="1" dirty="0" err="1" smtClean="0">
+                <a:solidFill>
+                  <a:schemeClr val="accent5">
+                    <a:lumMod val="75000"/>
+                  </a:schemeClr>
+                </a:solidFill>
+              </a:rPr>
+              <a:t>REDCap</a:t>
+            </a:r>
+            <a:r>
+              <a:rPr lang="en-US" b="1" dirty="0" smtClean="0">
+                <a:solidFill>
+                  <a:schemeClr val="accent5">
+                    <a:lumMod val="75000"/>
+                  </a:schemeClr>
+                </a:solidFill>
+              </a:rPr>
+              <a:t>-ETL server</a:t>
+            </a:r>
+            <a:endParaRPr lang="en-US" b="1" dirty="0">
+              <a:solidFill>
+                <a:schemeClr val="accent5">
+                  <a:lumMod val="75000"/>
+                </a:schemeClr>
+              </a:solidFill>
+            </a:endParaRPr>
+          </a:p>
+        </p:txBody>
+      </p:sp>
+      <p:sp>
+        <p:nvSpPr>
+          <p:cNvPr id="46" name="Rectangle 45"/>
+          <p:cNvSpPr/>
+          <p:nvPr/>
+        </p:nvSpPr>
+        <p:spPr>
+          <a:xfrm>
+            <a:off x="8265793" y="4170563"/>
+            <a:ext cx="500527" cy="307758"/>
           </a:xfrm>
           <a:prstGeom prst="rect">
             <a:avLst/>
           </a:prstGeom>
-          <a:solidFill>
-            <a:schemeClr val="bg1"/>
-          </a:solidFill>
+          <a:noFill/>
           <a:ln>
             <a:noFill/>
           </a:ln>
@@ -3014,7 +3088,67 @@
             <a:r>
               <a:rPr lang="en-US" sz="2000" b="1" dirty="0" smtClean="0">
                 <a:solidFill>
-                  <a:schemeClr val="accent2">
+                  <a:schemeClr val="bg2">
+                    <a:lumMod val="50000"/>
+                  </a:schemeClr>
+                </a:solidFill>
+              </a:rPr>
+              <a:t>Log</a:t>
+            </a:r>
+            <a:endParaRPr lang="en-US" sz="2000" b="1" dirty="0">
+              <a:solidFill>
+                <a:schemeClr val="bg2">
+                  <a:lumMod val="50000"/>
+                </a:schemeClr>
+              </a:solidFill>
+            </a:endParaRPr>
+          </a:p>
+        </p:txBody>
+      </p:sp>
+      <p:sp>
+        <p:nvSpPr>
+          <p:cNvPr id="22" name="Rectangle 21"/>
+          <p:cNvSpPr/>
+          <p:nvPr/>
+        </p:nvSpPr>
+        <p:spPr>
+          <a:xfrm>
+            <a:off x="8154070" y="3143042"/>
+            <a:ext cx="770339" cy="568168"/>
+          </a:xfrm>
+          <a:prstGeom prst="rect">
+            <a:avLst/>
+          </a:prstGeom>
+          <a:noFill/>
+          <a:ln>
+            <a:noFill/>
+          </a:ln>
+        </p:spPr>
+        <p:style>
+          <a:lnRef idx="2">
+            <a:schemeClr val="accent1">
+              <a:shade val="50000"/>
+            </a:schemeClr>
+          </a:lnRef>
+          <a:fillRef idx="1">
+            <a:schemeClr val="accent1"/>
+          </a:fillRef>
+          <a:effectRef idx="0">
+            <a:schemeClr val="accent1"/>
+          </a:effectRef>
+          <a:fontRef idx="minor">
+            <a:schemeClr val="lt1"/>
+          </a:fontRef>
+        </p:style>
+        <p:txBody>
+          <a:bodyPr lIns="0" rIns="0" rtlCol="0" anchor="ctr"/>
+          <a:lstStyle/>
+          <a:p>
+            <a:pPr algn="ctr"/>
+            <a:r>
+              <a:rPr lang="en-US" sz="2000" b="1" dirty="0" smtClean="0">
+                <a:solidFill>
+                  <a:schemeClr val="accent6">
                     <a:lumMod val="75000"/>
                   </a:schemeClr>
                 </a:solidFill>
@@ -3027,7 +3161,7 @@
             <a:r>
               <a:rPr lang="en-US" sz="2000" b="1" dirty="0" smtClean="0">
                 <a:solidFill>
-                  <a:schemeClr val="accent2">
+                  <a:schemeClr val="accent6">
                     <a:lumMod val="75000"/>
                   </a:schemeClr>
                 </a:solidFill>
@@ -3036,7 +3170,7 @@
             </a:r>
             <a:endParaRPr lang="en-US" sz="2000" b="1" dirty="0">
               <a:solidFill>
-                <a:schemeClr val="accent2">
+                <a:schemeClr val="accent6">
                   <a:lumMod val="75000"/>
                 </a:schemeClr>
               </a:solidFill>
@@ -3052,11 +3186,13 @@
         </p:nvSpPr>
         <p:spPr>
           <a:xfrm>
-            <a:off x="1944746" y="304784"/>
-            <a:ext cx="8379941" cy="1814939"/>
+            <a:off x="467274" y="2930305"/>
+            <a:ext cx="2111169" cy="1583196"/>
           </a:xfrm>
           <a:prstGeom prst="roundRect">
-            <a:avLst/>
+            <a:avLst>
+              <a:gd name="adj" fmla="val 9903"/>
+            </a:avLst>
           </a:prstGeom>
           <a:solidFill>
             <a:schemeClr val="accent1">
@@ -3109,14 +3245,14 @@
       </p:sp>
       <p:sp>
         <p:nvSpPr>
-          <p:cNvPr id="5" name="Rectangle 4"/>
+          <p:cNvPr id="7" name="Rectangle 6"/>
           <p:cNvSpPr/>
           <p:nvPr/>
         </p:nvSpPr>
         <p:spPr>
           <a:xfrm>
-            <a:off x="2239861" y="945832"/>
-            <a:ext cx="2390891" cy="674948"/>
+            <a:off x="869393" y="3506499"/>
+            <a:ext cx="1306929" cy="563448"/>
           </a:xfrm>
           <a:prstGeom prst="rect">
             <a:avLst/>
@@ -3154,30 +3290,7 @@
                   </a:schemeClr>
                 </a:solidFill>
               </a:rPr>
-              <a:t>Configuration Project</a:t>
-            </a:r>
-          </a:p>
-          <a:p>
-            <a:pPr algn="ctr"/>
-            <a:r>
-              <a:rPr lang="en-US" dirty="0" smtClean="0">
-                <a:solidFill>
-                  <a:schemeClr val="accent1">
-                    <a:lumMod val="75000"/>
-                  </a:schemeClr>
-                </a:solidFill>
-              </a:rPr>
-              <a:t>(</a:t>
-            </a:r>
-            <a:r>
-              <a:rPr lang="en-US" dirty="0" smtClean="0">
-                <a:solidFill>
-                  <a:schemeClr val="accent1">
-                    <a:lumMod val="75000"/>
-                  </a:schemeClr>
-                </a:solidFill>
-              </a:rPr>
-              <a:t>Optional - Deprecated)</a:t>
+              <a:t>Project</a:t>
             </a:r>
             <a:endParaRPr lang="en-US" dirty="0">
               <a:solidFill>
@@ -3191,154 +3304,13 @@
       </p:sp>
       <p:sp>
         <p:nvSpPr>
-          <p:cNvPr id="6" name="Rectangle 5"/>
-          <p:cNvSpPr/>
-          <p:nvPr/>
-        </p:nvSpPr>
-        <p:spPr>
-          <a:xfrm>
-            <a:off x="7695481" y="945831"/>
-            <a:ext cx="2388086" cy="674948"/>
-          </a:xfrm>
-          <a:prstGeom prst="rect">
-            <a:avLst/>
-          </a:prstGeom>
-          <a:solidFill>
-            <a:schemeClr val="bg1"/>
-          </a:solidFill>
-        </p:spPr>
-        <p:style>
-          <a:lnRef idx="2">
-            <a:schemeClr val="accent1">
-              <a:shade val="50000"/>
-            </a:schemeClr>
-          </a:lnRef>
-          <a:fillRef idx="1">
-            <a:schemeClr val="accent1"/>
-          </a:fillRef>
-          <a:effectRef idx="0">
-            <a:schemeClr val="accent1"/>
-          </a:effectRef>
-          <a:fontRef idx="minor">
-            <a:schemeClr val="lt1"/>
-          </a:fontRef>
-        </p:style>
-        <p:txBody>
-          <a:bodyPr rtlCol="0" anchor="ctr"/>
-          <a:lstStyle/>
-          <a:p>
-            <a:pPr algn="ctr"/>
-            <a:r>
-              <a:rPr lang="en-US" dirty="0" smtClean="0">
-                <a:solidFill>
-                  <a:schemeClr val="accent1">
-                    <a:lumMod val="75000"/>
-                  </a:schemeClr>
-                </a:solidFill>
-              </a:rPr>
-              <a:t>Logging Project</a:t>
-            </a:r>
-          </a:p>
-          <a:p>
-            <a:pPr algn="ctr"/>
-            <a:r>
-              <a:rPr lang="en-US" dirty="0" smtClean="0">
-                <a:solidFill>
-                  <a:schemeClr val="accent1">
-                    <a:lumMod val="75000"/>
-                  </a:schemeClr>
-                </a:solidFill>
-              </a:rPr>
-              <a:t>(</a:t>
-            </a:r>
-            <a:r>
-              <a:rPr lang="en-US" dirty="0" smtClean="0">
-                <a:solidFill>
-                  <a:schemeClr val="accent1">
-                    <a:lumMod val="75000"/>
-                  </a:schemeClr>
-                </a:solidFill>
-              </a:rPr>
-              <a:t>Optional - Deprecated)</a:t>
-            </a:r>
-            <a:endParaRPr lang="en-US" dirty="0">
-              <a:solidFill>
-                <a:schemeClr val="accent1">
-                  <a:lumMod val="75000"/>
-                </a:schemeClr>
-              </a:solidFill>
-            </a:endParaRPr>
-          </a:p>
-        </p:txBody>
-      </p:sp>
-      <p:sp>
-        <p:nvSpPr>
-          <p:cNvPr id="7" name="Rectangle 6"/>
-          <p:cNvSpPr/>
-          <p:nvPr/>
-        </p:nvSpPr>
-        <p:spPr>
-          <a:xfrm>
-            <a:off x="5027897" y="945831"/>
-            <a:ext cx="2233396" cy="674948"/>
-          </a:xfrm>
-          <a:prstGeom prst="rect">
-            <a:avLst/>
-          </a:prstGeom>
-          <a:solidFill>
-            <a:schemeClr val="bg1"/>
-          </a:solidFill>
-        </p:spPr>
-        <p:style>
-          <a:lnRef idx="2">
-            <a:schemeClr val="accent1">
-              <a:shade val="50000"/>
-            </a:schemeClr>
-          </a:lnRef>
-          <a:fillRef idx="1">
-            <a:schemeClr val="accent1"/>
-          </a:fillRef>
-          <a:effectRef idx="0">
-            <a:schemeClr val="accent1"/>
-          </a:effectRef>
-          <a:fontRef idx="minor">
-            <a:schemeClr val="lt1"/>
-          </a:fontRef>
-        </p:style>
-        <p:txBody>
-          <a:bodyPr rtlCol="0" anchor="ctr"/>
-          <a:lstStyle/>
-          <a:p>
-            <a:pPr algn="ctr"/>
-            <a:r>
-              <a:rPr lang="en-US" dirty="0" smtClean="0">
-                <a:solidFill>
-                  <a:schemeClr val="accent1">
-                    <a:lumMod val="75000"/>
-                  </a:schemeClr>
-                </a:solidFill>
-              </a:rPr>
-              <a:t>Data Project</a:t>
-            </a:r>
-            <a:endParaRPr lang="en-US" dirty="0">
-              <a:solidFill>
-                <a:schemeClr val="accent1">
-                  <a:lumMod val="75000"/>
-                </a:schemeClr>
-              </a:solidFill>
-            </a:endParaRPr>
-          </a:p>
-        </p:txBody>
-      </p:sp>
-      <p:sp>
-        <p:nvSpPr>
           <p:cNvPr id="10" name="Flowchart: Magnetic Disk 9"/>
           <p:cNvSpPr/>
           <p:nvPr/>
         </p:nvSpPr>
         <p:spPr>
           <a:xfrm>
-            <a:off x="5201175" y="5138338"/>
+            <a:off x="9558327" y="3066029"/>
             <a:ext cx="1886042" cy="1444388"/>
           </a:xfrm>
           <a:prstGeom prst="flowChartMagneticDisk">
@@ -3382,11 +3354,13 @@
         </p:nvSpPr>
         <p:spPr>
           <a:xfrm>
-            <a:off x="4947834" y="3263778"/>
-            <a:ext cx="2442949" cy="1076812"/>
+            <a:off x="4093032" y="2930305"/>
+            <a:ext cx="3658917" cy="1715836"/>
           </a:xfrm>
           <a:prstGeom prst="roundRect">
-            <a:avLst/>
+            <a:avLst>
+              <a:gd name="adj" fmla="val 8025"/>
+            </a:avLst>
           </a:prstGeom>
           <a:solidFill>
             <a:schemeClr val="accent1">
@@ -3418,23 +3392,23 @@
           </a:fontRef>
         </p:style>
         <p:txBody>
-          <a:bodyPr rtlCol="0" anchor="ctr"/>
+          <a:bodyPr rtlCol="0" anchor="t" anchorCtr="0"/>
           <a:lstStyle/>
           <a:p>
             <a:pPr algn="ctr"/>
             <a:r>
-              <a:rPr lang="en-US" dirty="0" err="1" smtClean="0"/>
+              <a:rPr lang="en-US" sz="2400" b="1" dirty="0" err="1" smtClean="0"/>
               <a:t>REDCap</a:t>
             </a:r>
             <a:r>
-              <a:rPr lang="en-US" dirty="0"/>
+              <a:rPr lang="en-US" sz="2400" b="1" dirty="0"/>
               <a:t>-</a:t>
             </a:r>
             <a:r>
-              <a:rPr lang="en-US" smtClean="0"/>
+              <a:rPr lang="en-US" sz="2400" b="1" dirty="0" smtClean="0"/>
               <a:t>ETL</a:t>
             </a:r>
-            <a:endParaRPr lang="en-US" dirty="0"/>
+            <a:endParaRPr lang="en-US" sz="2400" b="1" dirty="0"/>
           </a:p>
         </p:txBody>
       </p:sp>
@@ -3446,7 +3420,7 @@
         </p:nvSpPr>
         <p:spPr>
           <a:xfrm>
-            <a:off x="1109658" y="3473529"/>
+            <a:off x="5079720" y="1600096"/>
             <a:ext cx="1665027" cy="645539"/>
           </a:xfrm>
           <a:prstGeom prst="rect">
@@ -3486,22 +3460,22 @@
         <p:nvCxnSpPr>
           <p:cNvPr id="13" name="Straight Arrow Connector 12"/>
           <p:cNvCxnSpPr>
-            <a:stCxn id="11" idx="0"/>
-            <a:endCxn id="7" idx="2"/>
+            <a:stCxn id="11" idx="1"/>
+            <a:endCxn id="7" idx="3"/>
           </p:cNvCxnSpPr>
           <p:nvPr/>
         </p:nvCxnSpPr>
         <p:spPr>
-          <a:xfrm flipH="1" flipV="1">
-            <a:off x="6144595" y="1620779"/>
-            <a:ext cx="24714" cy="1642999"/>
+          <a:xfrm flipH="1">
+            <a:off x="2176322" y="3788223"/>
+            <a:ext cx="1916710" cy="0"/>
           </a:xfrm>
           <a:prstGeom prst="straightConnector1">
             <a:avLst/>
           </a:prstGeom>
           <a:ln w="50800">
             <a:solidFill>
-              <a:schemeClr val="accent2">
+              <a:schemeClr val="accent6">
                 <a:lumMod val="75000"/>
               </a:schemeClr>
             </a:solidFill>
@@ -3527,20 +3501,23 @@
       <p:cxnSp>
         <p:nvCxnSpPr>
           <p:cNvPr id="17" name="Straight Arrow Connector 16"/>
-          <p:cNvCxnSpPr/>
+          <p:cNvCxnSpPr>
+            <a:stCxn id="10" idx="2"/>
+            <a:endCxn id="11" idx="3"/>
+          </p:cNvCxnSpPr>
           <p:nvPr/>
         </p:nvCxnSpPr>
         <p:spPr>
-          <a:xfrm flipH="1" flipV="1">
-            <a:off x="6186087" y="4340590"/>
-            <a:ext cx="1" cy="1080015"/>
+          <a:xfrm flipH="1">
+            <a:off x="7751949" y="3788223"/>
+            <a:ext cx="1806378" cy="0"/>
           </a:xfrm>
           <a:prstGeom prst="straightConnector1">
             <a:avLst/>
           </a:prstGeom>
           <a:ln w="50800">
             <a:solidFill>
-              <a:schemeClr val="accent2">
+              <a:schemeClr val="accent6">
                 <a:lumMod val="75000"/>
               </a:schemeClr>
             </a:solidFill>
@@ -3571,15 +3548,13 @@
         </p:nvSpPr>
         <p:spPr>
           <a:xfrm>
-            <a:off x="6249371" y="2426386"/>
+            <a:off x="2708257" y="3156276"/>
             <a:ext cx="837845" cy="491085"/>
           </a:xfrm>
           <a:prstGeom prst="rect">
             <a:avLst/>
           </a:prstGeom>
-          <a:solidFill>
-            <a:schemeClr val="bg1"/>
-          </a:solidFill>
+          <a:noFill/>
           <a:ln>
             <a:noFill/>
           </a:ln>
@@ -3608,7 +3583,7 @@
             <a:r>
               <a:rPr lang="en-US" sz="2000" b="1" dirty="0" smtClean="0">
                 <a:solidFill>
-                  <a:schemeClr val="accent2">
+                  <a:schemeClr val="accent6">
                     <a:lumMod val="75000"/>
                   </a:schemeClr>
                 </a:solidFill>
@@ -3621,7 +3596,7 @@
             <a:r>
               <a:rPr lang="en-US" sz="2000" b="1" dirty="0" smtClean="0">
                 <a:solidFill>
-                  <a:schemeClr val="accent2">
+                  <a:schemeClr val="accent6">
                     <a:lumMod val="75000"/>
                   </a:schemeClr>
                 </a:solidFill>
@@ -3630,7 +3605,7 @@
             </a:r>
             <a:endParaRPr lang="en-US" sz="2000" b="1" dirty="0">
               <a:solidFill>
-                <a:schemeClr val="accent2">
+                <a:schemeClr val="accent6">
                   <a:lumMod val="75000"/>
                 </a:schemeClr>
               </a:solidFill>
@@ -3640,59 +3615,17 @@
       </p:sp>
       <p:cxnSp>
         <p:nvCxnSpPr>
-          <p:cNvPr id="23" name="Straight Arrow Connector 22"/>
-          <p:cNvCxnSpPr>
-            <a:stCxn id="11" idx="1"/>
-            <a:endCxn id="5" idx="2"/>
-          </p:cNvCxnSpPr>
-          <p:nvPr/>
-        </p:nvCxnSpPr>
-        <p:spPr>
-          <a:xfrm rot="10800000">
-            <a:off x="3435308" y="1620780"/>
-            <a:ext cx="1512527" cy="2181404"/>
-          </a:xfrm>
-          <a:prstGeom prst="bentConnector2">
-            <a:avLst/>
-          </a:prstGeom>
-          <a:ln w="50800">
-            <a:solidFill>
-              <a:schemeClr val="accent1">
-                <a:lumMod val="75000"/>
-              </a:schemeClr>
-            </a:solidFill>
-            <a:headEnd type="triangle" w="lg" len="lg"/>
-            <a:tailEnd type="none" w="lg" len="lg"/>
-          </a:ln>
-        </p:spPr>
-        <p:style>
-          <a:lnRef idx="1">
-            <a:schemeClr val="accent1"/>
-          </a:lnRef>
-          <a:fillRef idx="0">
-            <a:schemeClr val="accent1"/>
-          </a:fillRef>
-          <a:effectRef idx="0">
-            <a:schemeClr val="accent1"/>
-          </a:effectRef>
-          <a:fontRef idx="minor">
-            <a:schemeClr val="tx1"/>
-          </a:fontRef>
-        </p:style>
-      </p:cxnSp>
-      <p:cxnSp>
-        <p:nvCxnSpPr>
           <p:cNvPr id="28" name="Straight Arrow Connector 27"/>
           <p:cNvCxnSpPr>
-            <a:stCxn id="11" idx="1"/>
-            <a:endCxn id="12" idx="3"/>
+            <a:stCxn id="11" idx="0"/>
+            <a:endCxn id="12" idx="2"/>
           </p:cNvCxnSpPr>
           <p:nvPr/>
         </p:nvCxnSpPr>
         <p:spPr>
           <a:xfrm flipH="1" flipV="1">
-            <a:off x="2774685" y="3796299"/>
-            <a:ext cx="2173149" cy="5885"/>
+            <a:off x="5912234" y="2245635"/>
+            <a:ext cx="10257" cy="684670"/>
           </a:xfrm>
           <a:prstGeom prst="straightConnector1">
             <a:avLst/>
@@ -3722,22 +3655,128 @@
           </a:fontRef>
         </p:style>
       </p:cxnSp>
+      <p:sp>
+        <p:nvSpPr>
+          <p:cNvPr id="38" name="Rectangle 37"/>
+          <p:cNvSpPr/>
+          <p:nvPr/>
+        </p:nvSpPr>
+        <p:spPr>
+          <a:xfrm>
+            <a:off x="5133614" y="4745607"/>
+            <a:ext cx="752061" cy="267698"/>
+          </a:xfrm>
+          <a:prstGeom prst="rect">
+            <a:avLst/>
+          </a:prstGeom>
+          <a:noFill/>
+          <a:ln>
+            <a:noFill/>
+          </a:ln>
+        </p:spPr>
+        <p:style>
+          <a:lnRef idx="2">
+            <a:schemeClr val="accent1">
+              <a:shade val="50000"/>
+            </a:schemeClr>
+          </a:lnRef>
+          <a:fillRef idx="1">
+            <a:schemeClr val="accent1"/>
+          </a:fillRef>
+          <a:effectRef idx="0">
+            <a:schemeClr val="accent1"/>
+          </a:effectRef>
+          <a:fontRef idx="minor">
+            <a:schemeClr val="lt1"/>
+          </a:fontRef>
+        </p:style>
+        <p:txBody>
+          <a:bodyPr lIns="0" rIns="0" rtlCol="0" anchor="ctr"/>
+          <a:lstStyle/>
+          <a:p>
+            <a:pPr algn="ctr"/>
+            <a:r>
+              <a:rPr lang="en-US" sz="2000" b="1" dirty="0" smtClean="0">
+                <a:solidFill>
+                  <a:schemeClr val="bg2">
+                    <a:lumMod val="50000"/>
+                  </a:schemeClr>
+                </a:solidFill>
+              </a:rPr>
+              <a:t>Log</a:t>
+            </a:r>
+            <a:endParaRPr lang="en-US" sz="2000" b="1" dirty="0">
+              <a:solidFill>
+                <a:schemeClr val="bg2">
+                  <a:lumMod val="50000"/>
+                </a:schemeClr>
+              </a:solidFill>
+            </a:endParaRPr>
+          </a:p>
+        </p:txBody>
+      </p:sp>
+      <p:sp>
+        <p:nvSpPr>
+          <p:cNvPr id="39" name="Rectangle 38"/>
+          <p:cNvSpPr/>
+          <p:nvPr/>
+        </p:nvSpPr>
+        <p:spPr>
+          <a:xfrm>
+            <a:off x="4220648" y="5535601"/>
+            <a:ext cx="1665027" cy="795059"/>
+          </a:xfrm>
+          <a:prstGeom prst="rect">
+            <a:avLst/>
+          </a:prstGeom>
+        </p:spPr>
+        <p:style>
+          <a:lnRef idx="2">
+            <a:schemeClr val="accent1">
+              <a:shade val="50000"/>
+            </a:schemeClr>
+          </a:lnRef>
+          <a:fillRef idx="1">
+            <a:schemeClr val="accent1"/>
+          </a:fillRef>
+          <a:effectRef idx="0">
+            <a:schemeClr val="accent1"/>
+          </a:effectRef>
+          <a:fontRef idx="minor">
+            <a:schemeClr val="lt1"/>
+          </a:fontRef>
+        </p:style>
+        <p:txBody>
+          <a:bodyPr rtlCol="0" anchor="ctr"/>
+          <a:lstStyle/>
+          <a:p>
+            <a:pPr algn="ctr"/>
+            <a:r>
+              <a:rPr lang="en-US" dirty="0" smtClean="0"/>
+              <a:t>Log File (Optional)</a:t>
+            </a:r>
+            <a:endParaRPr lang="en-US" dirty="0"/>
+          </a:p>
+        </p:txBody>
+      </p:sp>
       <p:cxnSp>
         <p:nvCxnSpPr>
-          <p:cNvPr id="31" name="Straight Arrow Connector 22"/>
+          <p:cNvPr id="40" name="Straight Arrow Connector 39"/>
           <p:cNvCxnSpPr>
-            <a:stCxn id="6" idx="2"/>
-            <a:endCxn id="11" idx="3"/>
+            <a:stCxn id="39" idx="0"/>
+            <a:endCxn id="11" idx="2"/>
           </p:cNvCxnSpPr>
           <p:nvPr/>
         </p:nvCxnSpPr>
         <p:spPr>
-          <a:xfrm rot="5400000">
-            <a:off x="7049452" y="1962111"/>
-            <a:ext cx="2181405" cy="1498741"/>
+          <a:xfrm rot="5400000" flipH="1" flipV="1">
+            <a:off x="5043096" y="4656207"/>
+            <a:ext cx="889460" cy="869329"/>
           </a:xfrm>
-          <a:prstGeom prst="bentConnector2">
-            <a:avLst/>
+          <a:prstGeom prst="bentConnector3">
+            <a:avLst>
+              <a:gd name="adj1" fmla="val 50000"/>
+            </a:avLst>
           </a:prstGeom>
           <a:ln w="50800">
             <a:solidFill>
@@ -3766,162 +3805,14 @@
       </p:cxnSp>
       <p:sp>
         <p:nvSpPr>
-          <p:cNvPr id="38" name="Rectangle 37"/>
-          <p:cNvSpPr/>
-          <p:nvPr/>
-        </p:nvSpPr>
-        <p:spPr>
-          <a:xfrm>
-            <a:off x="7996123" y="3424733"/>
-            <a:ext cx="752061" cy="267698"/>
-          </a:xfrm>
-          <a:prstGeom prst="rect">
-            <a:avLst/>
-          </a:prstGeom>
-          <a:solidFill>
-            <a:schemeClr val="bg1"/>
-          </a:solidFill>
-          <a:ln>
-            <a:noFill/>
-          </a:ln>
-        </p:spPr>
-        <p:style>
-          <a:lnRef idx="2">
-            <a:schemeClr val="accent1">
-              <a:shade val="50000"/>
-            </a:schemeClr>
-          </a:lnRef>
-          <a:fillRef idx="1">
-            <a:schemeClr val="accent1"/>
-          </a:fillRef>
-          <a:effectRef idx="0">
-            <a:schemeClr val="accent1"/>
-          </a:effectRef>
-          <a:fontRef idx="minor">
-            <a:schemeClr val="lt1"/>
-          </a:fontRef>
-        </p:style>
-        <p:txBody>
-          <a:bodyPr lIns="0" rIns="0" rtlCol="0" anchor="ctr"/>
-          <a:lstStyle/>
-          <a:p>
-            <a:pPr algn="ctr"/>
-            <a:r>
-              <a:rPr lang="en-US" sz="2000" b="1" dirty="0" smtClean="0">
-                <a:solidFill>
-                  <a:schemeClr val="bg2">
-                    <a:lumMod val="50000"/>
-                  </a:schemeClr>
-                </a:solidFill>
-              </a:rPr>
-              <a:t>Log</a:t>
-            </a:r>
-            <a:endParaRPr lang="en-US" sz="2000" b="1" dirty="0">
-              <a:solidFill>
-                <a:schemeClr val="bg2">
-                  <a:lumMod val="50000"/>
-                </a:schemeClr>
-              </a:solidFill>
-            </a:endParaRPr>
-          </a:p>
-        </p:txBody>
-      </p:sp>
-      <p:sp>
-        <p:nvSpPr>
-          <p:cNvPr id="39" name="Rectangle 38"/>
-          <p:cNvSpPr/>
-          <p:nvPr/>
-        </p:nvSpPr>
-        <p:spPr>
-          <a:xfrm>
-            <a:off x="9833732" y="3409521"/>
-            <a:ext cx="1665027" cy="795059"/>
-          </a:xfrm>
-          <a:prstGeom prst="rect">
-            <a:avLst/>
-          </a:prstGeom>
-        </p:spPr>
-        <p:style>
-          <a:lnRef idx="2">
-            <a:schemeClr val="accent1">
-              <a:shade val="50000"/>
-            </a:schemeClr>
-          </a:lnRef>
-          <a:fillRef idx="1">
-            <a:schemeClr val="accent1"/>
-          </a:fillRef>
-          <a:effectRef idx="0">
-            <a:schemeClr val="accent1"/>
-          </a:effectRef>
-          <a:fontRef idx="minor">
-            <a:schemeClr val="lt1"/>
-          </a:fontRef>
-        </p:style>
-        <p:txBody>
-          <a:bodyPr rtlCol="0" anchor="ctr"/>
-          <a:lstStyle/>
-          <a:p>
-            <a:pPr algn="ctr"/>
-            <a:r>
-              <a:rPr lang="en-US" dirty="0" smtClean="0"/>
-              <a:t>Log File (Optional)</a:t>
-            </a:r>
-            <a:endParaRPr lang="en-US" dirty="0"/>
-          </a:p>
-        </p:txBody>
-      </p:sp>
-      <p:cxnSp>
-        <p:nvCxnSpPr>
-          <p:cNvPr id="40" name="Straight Arrow Connector 39"/>
-          <p:cNvCxnSpPr>
-            <a:stCxn id="39" idx="1"/>
-            <a:endCxn id="11" idx="3"/>
-          </p:cNvCxnSpPr>
-          <p:nvPr/>
-        </p:nvCxnSpPr>
-        <p:spPr>
-          <a:xfrm flipH="1" flipV="1">
-            <a:off x="7390783" y="3802184"/>
-            <a:ext cx="2442949" cy="4867"/>
-          </a:xfrm>
-          <a:prstGeom prst="straightConnector1">
-            <a:avLst/>
-          </a:prstGeom>
-          <a:ln w="50800">
-            <a:solidFill>
-              <a:schemeClr val="bg2">
-                <a:lumMod val="50000"/>
-              </a:schemeClr>
-            </a:solidFill>
-            <a:headEnd type="triangle" w="lg" len="lg"/>
-            <a:tailEnd type="none" w="lg" len="lg"/>
-          </a:ln>
-        </p:spPr>
-        <p:style>
-          <a:lnRef idx="1">
-            <a:schemeClr val="accent1"/>
-          </a:lnRef>
-          <a:fillRef idx="0">
-            <a:schemeClr val="accent1"/>
-          </a:fillRef>
-          <a:effectRef idx="0">
-            <a:schemeClr val="accent1"/>
-          </a:effectRef>
-          <a:fontRef idx="minor">
-            <a:schemeClr val="tx1"/>
-          </a:fontRef>
-        </p:style>
-      </p:cxnSp>
-      <p:sp>
-        <p:nvSpPr>
           <p:cNvPr id="44" name="Rounded Rectangle 43"/>
           <p:cNvSpPr/>
           <p:nvPr/>
         </p:nvSpPr>
         <p:spPr>
           <a:xfrm>
-            <a:off x="10070863" y="4728625"/>
-            <a:ext cx="1881091" cy="748613"/>
+            <a:off x="6140862" y="5535601"/>
+            <a:ext cx="1881091" cy="795059"/>
           </a:xfrm>
           <a:prstGeom prst="roundRect">
             <a:avLst/>
@@ -3979,18 +3870,19 @@
         <p:nvCxnSpPr>
           <p:cNvPr id="45" name="Straight Arrow Connector 22"/>
           <p:cNvCxnSpPr>
-            <a:stCxn id="44" idx="1"/>
+            <a:stCxn id="44" idx="0"/>
+            <a:endCxn id="11" idx="2"/>
           </p:cNvCxnSpPr>
           <p:nvPr/>
         </p:nvCxnSpPr>
         <p:spPr>
-          <a:xfrm rot="10800000">
-            <a:off x="7397221" y="4051884"/>
-            <a:ext cx="2673643" cy="1051049"/>
+          <a:xfrm rot="16200000" flipV="1">
+            <a:off x="6057220" y="4511412"/>
+            <a:ext cx="889460" cy="1158917"/>
           </a:xfrm>
           <a:prstGeom prst="bentConnector3">
             <a:avLst>
-              <a:gd name="adj1" fmla="val 80122"/>
+              <a:gd name="adj1" fmla="val 50000"/>
             </a:avLst>
           </a:prstGeom>
           <a:ln w="50800">
@@ -4024,15 +3916,13 @@
         </p:nvSpPr>
         <p:spPr>
           <a:xfrm>
-            <a:off x="8015096" y="4725383"/>
+            <a:off x="6074536" y="4724041"/>
             <a:ext cx="1809424" cy="277730"/>
           </a:xfrm>
           <a:prstGeom prst="rect">
             <a:avLst/>
           </a:prstGeom>
-          <a:solidFill>
-            <a:schemeClr val="bg1"/>
-          </a:solidFill>
+          <a:noFill/>
           <a:ln>
             <a:noFill/>
           </a:ln>
@@ -4074,448 +3964,6 @@
           </a:p>
         </p:txBody>
       </p:sp>
-      <p:sp>
-        <p:nvSpPr>
-          <p:cNvPr id="65" name="Rectangle 64"/>
-          <p:cNvSpPr/>
-          <p:nvPr/>
-        </p:nvSpPr>
-        <p:spPr>
-          <a:xfrm>
-            <a:off x="3068246" y="3865548"/>
-            <a:ext cx="1458294" cy="588645"/>
-          </a:xfrm>
-          <a:prstGeom prst="rect">
-            <a:avLst/>
-          </a:prstGeom>
-          <a:solidFill>
-            <a:schemeClr val="bg1"/>
-          </a:solidFill>
-          <a:ln>
-            <a:noFill/>
-          </a:ln>
-        </p:spPr>
-        <p:style>
-          <a:lnRef idx="2">
-            <a:schemeClr val="accent1">
-              <a:shade val="50000"/>
-            </a:schemeClr>
-          </a:lnRef>
-          <a:fillRef idx="1">
-            <a:schemeClr val="accent1"/>
-          </a:fillRef>
-          <a:effectRef idx="0">
-            <a:schemeClr val="accent1"/>
-          </a:effectRef>
-          <a:fontRef idx="minor">
-            <a:schemeClr val="lt1"/>
-          </a:fontRef>
-        </p:style>
-        <p:txBody>
-          <a:bodyPr lIns="0" rIns="0" rtlCol="0" anchor="ctr"/>
-          <a:lstStyle/>
-          <a:p>
-            <a:pPr algn="ctr"/>
-            <a:r>
-              <a:rPr lang="en-US" sz="2000" b="1" dirty="0" smtClean="0">
-                <a:solidFill>
-                  <a:schemeClr val="accent1">
-                    <a:lumMod val="75000"/>
-                  </a:schemeClr>
-                </a:solidFill>
-              </a:rPr>
-              <a:t>Get Configuration</a:t>
-            </a:r>
-            <a:endParaRPr lang="en-US" sz="2000" b="1" dirty="0">
-              <a:solidFill>
-                <a:schemeClr val="accent1">
-                  <a:lumMod val="75000"/>
-                </a:schemeClr>
-              </a:solidFill>
-            </a:endParaRPr>
-          </a:p>
-        </p:txBody>
-      </p:sp>
-      <p:sp>
-        <p:nvSpPr>
-          <p:cNvPr id="24" name="Rounded Rectangle 23"/>
-          <p:cNvSpPr/>
-          <p:nvPr/>
-        </p:nvSpPr>
-        <p:spPr>
-          <a:xfrm>
-            <a:off x="813732" y="4843846"/>
-            <a:ext cx="2731708" cy="1564106"/>
-          </a:xfrm>
-          <a:prstGeom prst="roundRect">
-            <a:avLst/>
-          </a:prstGeom>
-          <a:solidFill>
-            <a:schemeClr val="accent1">
-              <a:lumMod val="40000"/>
-              <a:lumOff val="60000"/>
-            </a:schemeClr>
-          </a:solidFill>
-          <a:ln w="25400"/>
-        </p:spPr>
-        <p:style>
-          <a:lnRef idx="2">
-            <a:schemeClr val="accent1">
-              <a:shade val="50000"/>
-            </a:schemeClr>
-          </a:lnRef>
-          <a:fillRef idx="1">
-            <a:schemeClr val="accent1"/>
-          </a:fillRef>
-          <a:effectRef idx="0">
-            <a:schemeClr val="accent1"/>
-          </a:effectRef>
-          <a:fontRef idx="minor">
-            <a:schemeClr val="lt1"/>
-          </a:fontRef>
-        </p:style>
-        <p:txBody>
-          <a:bodyPr rtlCol="0" anchor="t"/>
-          <a:lstStyle/>
-          <a:p>
-            <a:pPr algn="ctr"/>
-            <a:r>
-              <a:rPr lang="en-US" sz="2400" b="1" dirty="0" smtClean="0">
-                <a:solidFill>
-                  <a:schemeClr val="accent1">
-                    <a:lumMod val="50000"/>
-                  </a:schemeClr>
-                </a:solidFill>
-              </a:rPr>
-              <a:t>Web Server</a:t>
-            </a:r>
-          </a:p>
-          <a:p>
-            <a:pPr algn="ctr"/>
-            <a:r>
-              <a:rPr lang="en-US" b="1" dirty="0" smtClean="0">
-                <a:solidFill>
-                  <a:schemeClr val="accent1">
-                    <a:lumMod val="50000"/>
-                  </a:schemeClr>
-                </a:solidFill>
-              </a:rPr>
-              <a:t>(</a:t>
-            </a:r>
-            <a:r>
-              <a:rPr lang="en-US" b="1" dirty="0" smtClean="0">
-                <a:solidFill>
-                  <a:schemeClr val="accent1">
-                    <a:lumMod val="50000"/>
-                  </a:schemeClr>
-                </a:solidFill>
-              </a:rPr>
-              <a:t>Optional - Deprecated)</a:t>
-            </a:r>
-            <a:endParaRPr lang="en-US" b="1" dirty="0">
-              <a:solidFill>
-                <a:schemeClr val="accent1">
-                  <a:lumMod val="50000"/>
-                </a:schemeClr>
-              </a:solidFill>
-            </a:endParaRPr>
-          </a:p>
-        </p:txBody>
-      </p:sp>
-      <p:cxnSp>
-        <p:nvCxnSpPr>
-          <p:cNvPr id="25" name="Straight Arrow Connector 22"/>
-          <p:cNvCxnSpPr>
-            <a:stCxn id="33" idx="1"/>
-            <a:endCxn id="5" idx="1"/>
-          </p:cNvCxnSpPr>
-          <p:nvPr/>
-        </p:nvCxnSpPr>
-        <p:spPr>
-          <a:xfrm rot="10800000" flipH="1">
-            <a:off x="1367867" y="1283306"/>
-            <a:ext cx="871994" cy="4783056"/>
-          </a:xfrm>
-          <a:prstGeom prst="bentConnector3">
-            <a:avLst>
-              <a:gd name="adj1" fmla="val -114725"/>
-            </a:avLst>
-          </a:prstGeom>
-          <a:ln w="50800">
-            <a:solidFill>
-              <a:schemeClr val="accent6">
-                <a:lumMod val="75000"/>
-              </a:schemeClr>
-            </a:solidFill>
-            <a:headEnd type="triangle" w="lg" len="lg"/>
-            <a:tailEnd type="none" w="lg" len="lg"/>
-          </a:ln>
-        </p:spPr>
-        <p:style>
-          <a:lnRef idx="1">
-            <a:schemeClr val="accent1"/>
-          </a:lnRef>
-          <a:fillRef idx="0">
-            <a:schemeClr val="accent1"/>
-          </a:fillRef>
-          <a:effectRef idx="0">
-            <a:schemeClr val="accent1"/>
-          </a:effectRef>
-          <a:fontRef idx="minor">
-            <a:schemeClr val="tx1"/>
-          </a:fontRef>
-        </p:style>
-      </p:cxnSp>
-      <p:sp>
-        <p:nvSpPr>
-          <p:cNvPr id="33" name="Rectangle 32"/>
-          <p:cNvSpPr/>
-          <p:nvPr/>
-        </p:nvSpPr>
-        <p:spPr>
-          <a:xfrm>
-            <a:off x="1367867" y="5852437"/>
-            <a:ext cx="1611973" cy="427850"/>
-          </a:xfrm>
-          <a:prstGeom prst="rect">
-            <a:avLst/>
-          </a:prstGeom>
-          <a:solidFill>
-            <a:schemeClr val="bg1"/>
-          </a:solidFill>
-        </p:spPr>
-        <p:style>
-          <a:lnRef idx="2">
-            <a:schemeClr val="accent1">
-              <a:shade val="50000"/>
-            </a:schemeClr>
-          </a:lnRef>
-          <a:fillRef idx="1">
-            <a:schemeClr val="accent1"/>
-          </a:fillRef>
-          <a:effectRef idx="0">
-            <a:schemeClr val="accent1"/>
-          </a:effectRef>
-          <a:fontRef idx="minor">
-            <a:schemeClr val="lt1"/>
-          </a:fontRef>
-        </p:style>
-        <p:txBody>
-          <a:bodyPr rtlCol="0" anchor="ctr"/>
-          <a:lstStyle/>
-          <a:p>
-            <a:pPr algn="ctr"/>
-            <a:r>
-              <a:rPr lang="en-US" dirty="0" smtClean="0">
-                <a:solidFill>
-                  <a:schemeClr val="accent1">
-                    <a:lumMod val="75000"/>
-                  </a:schemeClr>
-                </a:solidFill>
-              </a:rPr>
-              <a:t>DET Web Script</a:t>
-            </a:r>
-            <a:endParaRPr lang="en-US" dirty="0">
-              <a:solidFill>
-                <a:schemeClr val="accent1">
-                  <a:lumMod val="75000"/>
-                </a:schemeClr>
-              </a:solidFill>
-            </a:endParaRPr>
-          </a:p>
-        </p:txBody>
-      </p:sp>
-      <p:sp>
-        <p:nvSpPr>
-          <p:cNvPr id="37" name="Rectangle 36"/>
-          <p:cNvSpPr/>
-          <p:nvPr/>
-        </p:nvSpPr>
-        <p:spPr>
-          <a:xfrm>
-            <a:off x="488768" y="1961917"/>
-            <a:ext cx="1299079" cy="978647"/>
-          </a:xfrm>
-          <a:prstGeom prst="rect">
-            <a:avLst/>
-          </a:prstGeom>
-          <a:solidFill>
-            <a:schemeClr val="bg1"/>
-          </a:solidFill>
-          <a:ln>
-            <a:noFill/>
-          </a:ln>
-        </p:spPr>
-        <p:style>
-          <a:lnRef idx="2">
-            <a:schemeClr val="accent1">
-              <a:shade val="50000"/>
-            </a:schemeClr>
-          </a:lnRef>
-          <a:fillRef idx="1">
-            <a:schemeClr val="accent1"/>
-          </a:fillRef>
-          <a:effectRef idx="0">
-            <a:schemeClr val="accent1"/>
-          </a:effectRef>
-          <a:fontRef idx="minor">
-            <a:schemeClr val="lt1"/>
-          </a:fontRef>
-        </p:style>
-        <p:txBody>
-          <a:bodyPr lIns="0" rIns="0" rtlCol="0" anchor="ctr"/>
-          <a:lstStyle/>
-          <a:p>
-            <a:pPr algn="ctr"/>
-            <a:r>
-              <a:rPr lang="en-US" sz="2000" b="1" dirty="0" smtClean="0">
-                <a:solidFill>
-                  <a:schemeClr val="accent6">
-                    <a:lumMod val="75000"/>
-                  </a:schemeClr>
-                </a:solidFill>
-              </a:rPr>
-              <a:t>DET </a:t>
-            </a:r>
-          </a:p>
-          <a:p>
-            <a:pPr algn="ctr"/>
-            <a:r>
-              <a:rPr lang="en-US" sz="2000" b="1" dirty="0" smtClean="0">
-                <a:solidFill>
-                  <a:schemeClr val="accent6">
-                    <a:lumMod val="75000"/>
-                  </a:schemeClr>
-                </a:solidFill>
-              </a:rPr>
-              <a:t>(Data Entry</a:t>
-            </a:r>
-          </a:p>
-          <a:p>
-            <a:pPr algn="ctr"/>
-            <a:r>
-              <a:rPr lang="en-US" sz="2000" b="1" dirty="0" smtClean="0">
-                <a:solidFill>
-                  <a:schemeClr val="accent6">
-                    <a:lumMod val="75000"/>
-                  </a:schemeClr>
-                </a:solidFill>
-              </a:rPr>
-              <a:t> Trigger) </a:t>
-            </a:r>
-            <a:endParaRPr lang="en-US" sz="2000" b="1" dirty="0">
-              <a:solidFill>
-                <a:schemeClr val="accent6">
-                  <a:lumMod val="75000"/>
-                </a:schemeClr>
-              </a:solidFill>
-            </a:endParaRPr>
-          </a:p>
-        </p:txBody>
-      </p:sp>
-      <p:cxnSp>
-        <p:nvCxnSpPr>
-          <p:cNvPr id="41" name="Straight Arrow Connector 40"/>
-          <p:cNvCxnSpPr>
-            <a:endCxn id="33" idx="3"/>
-          </p:cNvCxnSpPr>
-          <p:nvPr/>
-        </p:nvCxnSpPr>
-        <p:spPr>
-          <a:xfrm flipH="1">
-            <a:off x="2979840" y="4305440"/>
-            <a:ext cx="2048058" cy="1760922"/>
-          </a:xfrm>
-          <a:prstGeom prst="straightConnector1">
-            <a:avLst/>
-          </a:prstGeom>
-          <a:ln w="50800">
-            <a:solidFill>
-              <a:schemeClr val="accent6">
-                <a:lumMod val="75000"/>
-              </a:schemeClr>
-            </a:solidFill>
-            <a:headEnd type="triangle" w="lg" len="lg"/>
-            <a:tailEnd type="none" w="lg" len="lg"/>
-          </a:ln>
-        </p:spPr>
-        <p:style>
-          <a:lnRef idx="1">
-            <a:schemeClr val="accent1"/>
-          </a:lnRef>
-          <a:fillRef idx="0">
-            <a:schemeClr val="accent1"/>
-          </a:fillRef>
-          <a:effectRef idx="0">
-            <a:schemeClr val="accent1"/>
-          </a:effectRef>
-          <a:fontRef idx="minor">
-            <a:schemeClr val="tx1"/>
-          </a:fontRef>
-        </p:style>
-      </p:cxnSp>
-      <p:sp>
-        <p:nvSpPr>
-          <p:cNvPr id="42" name="Rectangle 41"/>
-          <p:cNvSpPr/>
-          <p:nvPr/>
-        </p:nvSpPr>
-        <p:spPr>
-          <a:xfrm>
-            <a:off x="3940244" y="5340264"/>
-            <a:ext cx="458407" cy="267698"/>
-          </a:xfrm>
-          <a:prstGeom prst="rect">
-            <a:avLst/>
-          </a:prstGeom>
-          <a:solidFill>
-            <a:schemeClr val="bg1"/>
-          </a:solidFill>
-          <a:ln>
-            <a:noFill/>
-          </a:ln>
-        </p:spPr>
-        <p:style>
-          <a:lnRef idx="2">
-            <a:schemeClr val="accent1">
-              <a:shade val="50000"/>
-            </a:schemeClr>
-          </a:lnRef>
-          <a:fillRef idx="1">
-            <a:schemeClr val="accent1"/>
-          </a:fillRef>
-          <a:effectRef idx="0">
-            <a:schemeClr val="accent1"/>
-          </a:effectRef>
-          <a:fontRef idx="minor">
-            <a:schemeClr val="lt1"/>
-          </a:fontRef>
-        </p:style>
-        <p:txBody>
-          <a:bodyPr lIns="0" rIns="0" rtlCol="0" anchor="ctr"/>
-          <a:lstStyle/>
-          <a:p>
-            <a:pPr algn="ctr"/>
-            <a:r>
-              <a:rPr lang="en-US" sz="2000" b="1" dirty="0" smtClean="0">
-                <a:solidFill>
-                  <a:schemeClr val="accent6">
-                    <a:lumMod val="75000"/>
-                  </a:schemeClr>
-                </a:solidFill>
-              </a:rPr>
-              <a:t>Run</a:t>
-            </a:r>
-            <a:endParaRPr lang="en-US" sz="2000" b="1" dirty="0">
-              <a:solidFill>
-                <a:schemeClr val="accent6">
-                  <a:lumMod val="75000"/>
-                </a:schemeClr>
-              </a:solidFill>
-            </a:endParaRPr>
-          </a:p>
-        </p:txBody>
-      </p:sp>
       <p:cxnSp>
         <p:nvCxnSpPr>
           <p:cNvPr id="43" name="Straight Arrow Connector 42"/>
@@ -4523,9 +3971,9 @@
           <p:nvPr/>
         </p:nvCxnSpPr>
         <p:spPr>
-          <a:xfrm flipH="1" flipV="1">
-            <a:off x="5767877" y="4345457"/>
-            <a:ext cx="16969" cy="1071945"/>
+          <a:xfrm flipH="1">
+            <a:off x="7751949" y="4109603"/>
+            <a:ext cx="1806378" cy="0"/>
           </a:xfrm>
           <a:prstGeom prst="straightConnector1">
             <a:avLst/>
@@ -4555,68 +4003,6 @@
           </a:fontRef>
         </p:style>
       </p:cxnSp>
-      <p:sp>
-        <p:nvSpPr>
-          <p:cNvPr id="46" name="Rectangle 45"/>
-          <p:cNvSpPr/>
-          <p:nvPr/>
-        </p:nvSpPr>
-        <p:spPr>
-          <a:xfrm>
-            <a:off x="5205244" y="4541398"/>
-            <a:ext cx="500527" cy="307758"/>
-          </a:xfrm>
-          <a:prstGeom prst="rect">
-            <a:avLst/>
-          </a:prstGeom>
-          <a:solidFill>
-            <a:schemeClr val="bg1"/>
-          </a:solidFill>
-          <a:ln>
-            <a:noFill/>
-          </a:ln>
-        </p:spPr>
-        <p:style>
-          <a:lnRef idx="2">
-            <a:schemeClr val="accent1">
-              <a:shade val="50000"/>
-            </a:schemeClr>
-          </a:lnRef>
-          <a:fillRef idx="1">
-            <a:schemeClr val="accent1"/>
-          </a:fillRef>
-          <a:effectRef idx="0">
-            <a:schemeClr val="accent1"/>
-          </a:effectRef>
-          <a:fontRef idx="minor">
-            <a:schemeClr val="lt1"/>
-          </a:fontRef>
-        </p:style>
-        <p:txBody>
-          <a:bodyPr lIns="0" rIns="0" rtlCol="0" anchor="ctr"/>
-          <a:lstStyle/>
-          <a:p>
-            <a:pPr algn="ctr"/>
-            <a:r>
-              <a:rPr lang="en-US" sz="2000" b="1" dirty="0" smtClean="0">
-                <a:solidFill>
-                  <a:schemeClr val="bg2">
-                    <a:lumMod val="50000"/>
-                  </a:schemeClr>
-                </a:solidFill>
-              </a:rPr>
-              <a:t>Log</a:t>
-            </a:r>
-            <a:endParaRPr lang="en-US" sz="2000" b="1" dirty="0">
-              <a:solidFill>
-                <a:schemeClr val="bg2">
-                  <a:lumMod val="50000"/>
-                </a:schemeClr>
-              </a:solidFill>
-            </a:endParaRPr>
-          </a:p>
-        </p:txBody>
-      </p:sp>
     </p:spTree>
     <p:extLst>
       <p:ext uri="{BB962C8B-B14F-4D97-AF65-F5344CB8AC3E}">

</xml_diff>